<commit_message>
Agregado ppt y configurado diagrama de casos deuso
</commit_message>
<xml_diff>
--- a/Presentación1.pptx
+++ b/Presentación1.pptx
@@ -2,7 +2,7 @@
 <file path=ppt/presentation.xml><?xml version="1.0" encoding="utf-8"?>
 <p:presentation xmlns:a="http://schemas.openxmlformats.org/drawingml/2006/main" xmlns:r="http://schemas.openxmlformats.org/officeDocument/2006/relationships" xmlns:p="http://schemas.openxmlformats.org/presentationml/2006/main" saveSubsetFonts="1">
   <p:sldMasterIdLst>
-    <p:sldMasterId id="2147483660" r:id="rId1"/>
+    <p:sldMasterId id="2147483696" r:id="rId1"/>
   </p:sldMasterIdLst>
   <p:sldIdLst>
     <p:sldId id="256" r:id="rId2"/>
@@ -111,7 +111,7 @@
 </file>
 
 <file path=ppt/slideLayouts/slideLayout1.xml><?xml version="1.0" encoding="utf-8"?>
-<p:sldLayout xmlns:a="http://schemas.openxmlformats.org/drawingml/2006/main" xmlns:r="http://schemas.openxmlformats.org/officeDocument/2006/relationships" xmlns:p="http://schemas.openxmlformats.org/presentationml/2006/main" showMasterSp="0" type="title" preserve="1">
+<p:sldLayout xmlns:a="http://schemas.openxmlformats.org/drawingml/2006/main" xmlns:r="http://schemas.openxmlformats.org/officeDocument/2006/relationships" xmlns:p="http://schemas.openxmlformats.org/presentationml/2006/main" type="title" preserve="1">
   <p:cSld name="Diapositiva de título">
     <p:spTree>
       <p:nvGrpSpPr>
@@ -129,93 +129,40 @@
       </p:grpSpPr>
       <p:sp>
         <p:nvSpPr>
-          <p:cNvPr id="7" name="Rectangle 6"/>
-          <p:cNvSpPr/>
-          <p:nvPr/>
-        </p:nvSpPr>
-        <p:spPr>
-          <a:xfrm>
-            <a:off x="7010400" y="152399"/>
-            <a:ext cx="1981200" cy="6556248"/>
-          </a:xfrm>
-          <a:prstGeom prst="rect">
-            <a:avLst/>
-          </a:prstGeom>
-          <a:solidFill>
-            <a:schemeClr val="accent1"/>
-          </a:solidFill>
-          <a:ln>
-            <a:noFill/>
-          </a:ln>
-        </p:spPr>
-        <p:style>
-          <a:lnRef idx="2">
-            <a:schemeClr val="accent1">
-              <a:shade val="50000"/>
-            </a:schemeClr>
-          </a:lnRef>
-          <a:fillRef idx="1">
-            <a:schemeClr val="accent1"/>
-          </a:fillRef>
-          <a:effectRef idx="0">
-            <a:schemeClr val="accent1"/>
-          </a:effectRef>
-          <a:fontRef idx="minor">
-            <a:schemeClr val="lt1"/>
-          </a:fontRef>
-        </p:style>
-        <p:txBody>
-          <a:bodyPr rtlCol="0" anchor="ctr"/>
-          <a:lstStyle/>
-          <a:p>
-            <a:pPr algn="ctr"/>
-            <a:endParaRPr lang="en-US"/>
-          </a:p>
-        </p:txBody>
-      </p:sp>
-      <p:sp>
-        <p:nvSpPr>
-          <p:cNvPr id="8" name="Rectangle 7"/>
-          <p:cNvSpPr/>
-          <p:nvPr/>
-        </p:nvSpPr>
-        <p:spPr>
-          <a:xfrm>
-            <a:off x="152400" y="153923"/>
-            <a:ext cx="6705600" cy="6553200"/>
-          </a:xfrm>
-          <a:prstGeom prst="rect">
-            <a:avLst/>
-          </a:prstGeom>
-          <a:solidFill>
-            <a:schemeClr val="tx2"/>
-          </a:solidFill>
-          <a:ln>
-            <a:noFill/>
-          </a:ln>
-        </p:spPr>
-        <p:style>
-          <a:lnRef idx="2">
-            <a:schemeClr val="accent1">
-              <a:shade val="50000"/>
-            </a:schemeClr>
-          </a:lnRef>
-          <a:fillRef idx="1">
-            <a:schemeClr val="accent1"/>
-          </a:fillRef>
-          <a:effectRef idx="0">
-            <a:schemeClr val="accent1"/>
-          </a:effectRef>
-          <a:fontRef idx="minor">
-            <a:schemeClr val="lt1"/>
-          </a:fontRef>
-        </p:style>
-        <p:txBody>
-          <a:bodyPr rtlCol="0" anchor="ctr"/>
-          <a:lstStyle/>
-          <a:p>
-            <a:pPr algn="ctr"/>
-            <a:endParaRPr lang="en-US"/>
+          <p:cNvPr id="2" name="Title 1"/>
+          <p:cNvSpPr>
+            <a:spLocks noGrp="1"/>
+          </p:cNvSpPr>
+          <p:nvPr>
+            <p:ph type="ctrTitle"/>
+          </p:nvPr>
+        </p:nvSpPr>
+        <p:spPr>
+          <a:xfrm>
+            <a:off x="685800" y="1905000"/>
+            <a:ext cx="7543800" cy="2593975"/>
+          </a:xfrm>
+        </p:spPr>
+        <p:txBody>
+          <a:bodyPr anchor="b"/>
+          <a:lstStyle>
+            <a:lvl1pPr>
+              <a:defRPr sz="6600">
+                <a:ln>
+                  <a:noFill/>
+                </a:ln>
+                <a:solidFill>
+                  <a:schemeClr val="tx2"/>
+                </a:solidFill>
+              </a:defRPr>
+            </a:lvl1pPr>
+          </a:lstStyle>
+          <a:p>
+            <a:r>
+              <a:rPr lang="es-ES" smtClean="0"/>
+              <a:t>Haga clic para modificar el estilo de título del patrón</a:t>
+            </a:r>
+            <a:endParaRPr lang="en-US" dirty="0"/>
           </a:p>
         </p:txBody>
       </p:sp>
@@ -231,20 +178,22 @@
         </p:nvSpPr>
         <p:spPr>
           <a:xfrm>
-            <a:off x="7010400" y="2052960"/>
-            <a:ext cx="1981200" cy="1828800"/>
-          </a:xfrm>
-        </p:spPr>
-        <p:txBody>
-          <a:bodyPr anchor="ctr">
+            <a:off x="685800" y="4572000"/>
+            <a:ext cx="6461760" cy="1066800"/>
+          </a:xfrm>
+        </p:spPr>
+        <p:txBody>
+          <a:bodyPr anchor="t">
             <a:normAutofit/>
           </a:bodyPr>
           <a:lstStyle>
             <a:lvl1pPr marL="0" indent="0" algn="l">
               <a:buNone/>
-              <a:defRPr sz="1900">
+              <a:defRPr sz="2000">
                 <a:solidFill>
-                  <a:srgbClr val="FFFFFF"/>
+                  <a:schemeClr val="tx1">
+                    <a:tint val="75000"/>
+                  </a:schemeClr>
                 </a:solidFill>
               </a:defRPr>
             </a:lvl1pPr>
@@ -340,7 +289,7 @@
       </p:sp>
       <p:sp>
         <p:nvSpPr>
-          <p:cNvPr id="10" name="Date Placeholder 9"/>
+          <p:cNvPr id="4" name="Date Placeholder 3"/>
           <p:cNvSpPr>
             <a:spLocks noGrp="1"/>
           </p:cNvSpPr>
@@ -351,19 +300,11 @@
         <p:spPr/>
         <p:txBody>
           <a:bodyPr/>
-          <a:lstStyle>
-            <a:lvl1pPr>
-              <a:defRPr>
-                <a:solidFill>
-                  <a:schemeClr val="bg2"/>
-                </a:solidFill>
-              </a:defRPr>
-            </a:lvl1pPr>
-          </a:lstStyle>
+          <a:lstStyle/>
           <a:p>
             <a:fld id="{6E623EF4-7B94-4DE9-BEA9-6E505CCCEE3B}" type="datetimeFigureOut">
               <a:rPr lang="es-CL" smtClean="0"/>
-              <a:t>05-09-2016</a:t>
+              <a:t>06-09-2016</a:t>
             </a:fld>
             <a:endParaRPr lang="es-CL"/>
           </a:p>
@@ -371,91 +312,43 @@
       </p:sp>
       <p:sp>
         <p:nvSpPr>
-          <p:cNvPr id="11" name="Slide Number Placeholder 10"/>
-          <p:cNvSpPr>
-            <a:spLocks noGrp="1"/>
-          </p:cNvSpPr>
-          <p:nvPr>
-            <p:ph type="sldNum" sz="quarter" idx="11"/>
+          <p:cNvPr id="5" name="Footer Placeholder 4"/>
+          <p:cNvSpPr>
+            <a:spLocks noGrp="1"/>
+          </p:cNvSpPr>
+          <p:nvPr>
+            <p:ph type="ftr" sz="quarter" idx="11"/>
           </p:nvPr>
         </p:nvSpPr>
         <p:spPr/>
         <p:txBody>
           <a:bodyPr/>
-          <a:lstStyle>
-            <a:lvl1pPr>
-              <a:defRPr>
-                <a:solidFill>
-                  <a:srgbClr val="FFFFFF"/>
-                </a:solidFill>
-              </a:defRPr>
-            </a:lvl1pPr>
-          </a:lstStyle>
+          <a:lstStyle/>
+          <a:p>
+            <a:endParaRPr lang="es-CL"/>
+          </a:p>
+        </p:txBody>
+      </p:sp>
+      <p:sp>
+        <p:nvSpPr>
+          <p:cNvPr id="6" name="Slide Number Placeholder 5"/>
+          <p:cNvSpPr>
+            <a:spLocks noGrp="1"/>
+          </p:cNvSpPr>
+          <p:nvPr>
+            <p:ph type="sldNum" sz="quarter" idx="12"/>
+          </p:nvPr>
+        </p:nvSpPr>
+        <p:spPr/>
+        <p:txBody>
+          <a:bodyPr/>
+          <a:lstStyle/>
           <a:p>
             <a:fld id="{B86FBE9E-6D20-44CB-A392-46B1E8398966}" type="slidenum">
               <a:rPr lang="es-CL" smtClean="0"/>
               <a:t>‹Nº›</a:t>
             </a:fld>
             <a:endParaRPr lang="es-CL"/>
-          </a:p>
-        </p:txBody>
-      </p:sp>
-      <p:sp>
-        <p:nvSpPr>
-          <p:cNvPr id="12" name="Footer Placeholder 11"/>
-          <p:cNvSpPr>
-            <a:spLocks noGrp="1"/>
-          </p:cNvSpPr>
-          <p:nvPr>
-            <p:ph type="ftr" sz="quarter" idx="12"/>
-          </p:nvPr>
-        </p:nvSpPr>
-        <p:spPr/>
-        <p:txBody>
-          <a:bodyPr/>
-          <a:lstStyle>
-            <a:lvl1pPr>
-              <a:defRPr>
-                <a:solidFill>
-                  <a:schemeClr val="bg2"/>
-                </a:solidFill>
-              </a:defRPr>
-            </a:lvl1pPr>
-          </a:lstStyle>
-          <a:p>
-            <a:endParaRPr lang="es-CL"/>
-          </a:p>
-        </p:txBody>
-      </p:sp>
-      <p:sp>
-        <p:nvSpPr>
-          <p:cNvPr id="13" name="Title 12"/>
-          <p:cNvSpPr>
-            <a:spLocks noGrp="1"/>
-          </p:cNvSpPr>
-          <p:nvPr>
-            <p:ph type="title"/>
-          </p:nvPr>
-        </p:nvSpPr>
-        <p:spPr>
-          <a:xfrm>
-            <a:off x="457200" y="2052960"/>
-            <a:ext cx="6324600" cy="1828800"/>
-          </a:xfrm>
-        </p:spPr>
-        <p:txBody>
-          <a:bodyPr/>
-          <a:lstStyle>
-            <a:lvl1pPr algn="r">
-              <a:defRPr sz="4200" spc="150" baseline="0"/>
-            </a:lvl1pPr>
-          </a:lstStyle>
-          <a:p>
-            <a:r>
-              <a:rPr lang="es-ES" smtClean="0"/>
-              <a:t>Haga clic para modificar el estilo de título del patrón</a:t>
-            </a:r>
-            <a:endParaRPr lang="en-US" dirty="0"/>
           </a:p>
         </p:txBody>
       </p:sp>
@@ -576,7 +469,7 @@
           <a:p>
             <a:fld id="{6E623EF4-7B94-4DE9-BEA9-6E505CCCEE3B}" type="datetimeFigureOut">
               <a:rPr lang="es-CL" smtClean="0"/>
-              <a:t>05-09-2016</a:t>
+              <a:t>06-09-2016</a:t>
             </a:fld>
             <a:endParaRPr lang="es-CL"/>
           </a:p>
@@ -633,7 +526,7 @@
 </file>
 
 <file path=ppt/slideLayouts/slideLayout11.xml><?xml version="1.0" encoding="utf-8"?>
-<p:sldLayout xmlns:a="http://schemas.openxmlformats.org/drawingml/2006/main" xmlns:r="http://schemas.openxmlformats.org/officeDocument/2006/relationships" xmlns:p="http://schemas.openxmlformats.org/presentationml/2006/main" showMasterSp="0" type="vertTitleAndTx" preserve="1">
+<p:sldLayout xmlns:a="http://schemas.openxmlformats.org/drawingml/2006/main" xmlns:r="http://schemas.openxmlformats.org/officeDocument/2006/relationships" xmlns:p="http://schemas.openxmlformats.org/presentationml/2006/main" type="vertTitleAndTx" preserve="1">
   <p:cSld name="Título vertical y texto">
     <p:spTree>
       <p:nvGrpSpPr>
@@ -651,98 +544,6 @@
       </p:grpSpPr>
       <p:sp>
         <p:nvSpPr>
-          <p:cNvPr id="7" name="Rectangle 6"/>
-          <p:cNvSpPr/>
-          <p:nvPr/>
-        </p:nvSpPr>
-        <p:spPr>
-          <a:xfrm>
-            <a:off x="152400" y="147319"/>
-            <a:ext cx="6705600" cy="6556248"/>
-          </a:xfrm>
-          <a:prstGeom prst="rect">
-            <a:avLst/>
-          </a:prstGeom>
-          <a:solidFill>
-            <a:schemeClr val="bg2"/>
-          </a:solidFill>
-          <a:ln>
-            <a:noFill/>
-          </a:ln>
-        </p:spPr>
-        <p:style>
-          <a:lnRef idx="2">
-            <a:schemeClr val="accent1">
-              <a:shade val="50000"/>
-            </a:schemeClr>
-          </a:lnRef>
-          <a:fillRef idx="1">
-            <a:schemeClr val="accent1"/>
-          </a:fillRef>
-          <a:effectRef idx="0">
-            <a:schemeClr val="accent1"/>
-          </a:effectRef>
-          <a:fontRef idx="minor">
-            <a:schemeClr val="lt1"/>
-          </a:fontRef>
-        </p:style>
-        <p:txBody>
-          <a:bodyPr rtlCol="0" anchor="ctr"/>
-          <a:lstStyle/>
-          <a:p>
-            <a:pPr algn="ctr"/>
-            <a:endParaRPr lang="en-US"/>
-          </a:p>
-        </p:txBody>
-      </p:sp>
-      <p:sp>
-        <p:nvSpPr>
-          <p:cNvPr id="8" name="Rectangle 7"/>
-          <p:cNvSpPr/>
-          <p:nvPr/>
-        </p:nvSpPr>
-        <p:spPr>
-          <a:xfrm>
-            <a:off x="7010400" y="147319"/>
-            <a:ext cx="1956046" cy="6556248"/>
-          </a:xfrm>
-          <a:prstGeom prst="rect">
-            <a:avLst/>
-          </a:prstGeom>
-          <a:solidFill>
-            <a:schemeClr val="tx2"/>
-          </a:solidFill>
-          <a:ln>
-            <a:noFill/>
-          </a:ln>
-        </p:spPr>
-        <p:style>
-          <a:lnRef idx="2">
-            <a:schemeClr val="accent1">
-              <a:shade val="50000"/>
-            </a:schemeClr>
-          </a:lnRef>
-          <a:fillRef idx="1">
-            <a:schemeClr val="accent1"/>
-          </a:fillRef>
-          <a:effectRef idx="0">
-            <a:schemeClr val="accent1"/>
-          </a:effectRef>
-          <a:fontRef idx="minor">
-            <a:schemeClr val="lt1"/>
-          </a:fontRef>
-        </p:style>
-        <p:txBody>
-          <a:bodyPr rtlCol="0" anchor="ctr"/>
-          <a:lstStyle/>
-          <a:p>
-            <a:pPr algn="ctr"/>
-            <a:endParaRPr lang="en-US"/>
-          </a:p>
-        </p:txBody>
-      </p:sp>
-      <p:sp>
-        <p:nvSpPr>
           <p:cNvPr id="2" name="Vertical Title 1"/>
           <p:cNvSpPr>
             <a:spLocks noGrp="1"/>
@@ -753,12 +554,12 @@
         </p:nvSpPr>
         <p:spPr>
           <a:xfrm>
-            <a:off x="7162800" y="274638"/>
-            <a:ext cx="1676400" cy="5851525"/>
-          </a:xfrm>
-        </p:spPr>
-        <p:txBody>
-          <a:bodyPr vert="eaVert"/>
+            <a:off x="6629400" y="274638"/>
+            <a:ext cx="1752600" cy="5851525"/>
+          </a:xfrm>
+        </p:spPr>
+        <p:txBody>
+          <a:bodyPr vert="eaVert" anchor="b" anchorCtr="0"/>
           <a:lstStyle/>
           <a:p>
             <a:r>
@@ -822,7 +623,7 @@
               <a:rPr lang="es-ES" smtClean="0"/>
               <a:t>Quinto nivel</a:t>
             </a:r>
-            <a:endParaRPr lang="en-US" dirty="0"/>
+            <a:endParaRPr lang="en-US"/>
           </a:p>
         </p:txBody>
       </p:sp>
@@ -843,7 +644,7 @@
           <a:p>
             <a:fld id="{6E623EF4-7B94-4DE9-BEA9-6E505CCCEE3B}" type="datetimeFigureOut">
               <a:rPr lang="es-CL" smtClean="0"/>
-              <a:t>05-09-2016</a:t>
+              <a:t>06-09-2016</a:t>
             </a:fld>
             <a:endParaRPr lang="es-CL"/>
           </a:p>
@@ -881,15 +682,7 @@
         <p:spPr/>
         <p:txBody>
           <a:bodyPr/>
-          <a:lstStyle>
-            <a:lvl1pPr>
-              <a:defRPr>
-                <a:solidFill>
-                  <a:schemeClr val="bg2"/>
-                </a:solidFill>
-              </a:defRPr>
-            </a:lvl1pPr>
-          </a:lstStyle>
+          <a:lstStyle/>
           <a:p>
             <a:fld id="{B86FBE9E-6D20-44CB-A392-46B1E8398966}" type="slidenum">
               <a:rPr lang="es-CL" smtClean="0"/>
@@ -926,6 +719,29 @@
       </p:grpSpPr>
       <p:sp>
         <p:nvSpPr>
+          <p:cNvPr id="2" name="Title 1"/>
+          <p:cNvSpPr>
+            <a:spLocks noGrp="1"/>
+          </p:cNvSpPr>
+          <p:nvPr>
+            <p:ph type="title"/>
+          </p:nvPr>
+        </p:nvSpPr>
+        <p:spPr/>
+        <p:txBody>
+          <a:bodyPr/>
+          <a:lstStyle/>
+          <a:p>
+            <a:r>
+              <a:rPr lang="es-ES" smtClean="0"/>
+              <a:t>Haga clic para modificar el estilo de título del patrón</a:t>
+            </a:r>
+            <a:endParaRPr lang="en-US"/>
+          </a:p>
+        </p:txBody>
+      </p:sp>
+      <p:sp>
+        <p:nvSpPr>
           <p:cNvPr id="3" name="Content Placeholder 2"/>
           <p:cNvSpPr>
             <a:spLocks noGrp="1"/>
@@ -972,7 +788,7 @@
               <a:rPr lang="es-ES" smtClean="0"/>
               <a:t>Quinto nivel</a:t>
             </a:r>
-            <a:endParaRPr lang="en-US" dirty="0"/>
+            <a:endParaRPr lang="en-US"/>
           </a:p>
         </p:txBody>
       </p:sp>
@@ -993,7 +809,7 @@
           <a:p>
             <a:fld id="{6E623EF4-7B94-4DE9-BEA9-6E505CCCEE3B}" type="datetimeFigureOut">
               <a:rPr lang="es-CL" smtClean="0"/>
-              <a:t>05-09-2016</a:t>
+              <a:t>06-09-2016</a:t>
             </a:fld>
             <a:endParaRPr lang="es-CL"/>
           </a:p>
@@ -1038,29 +854,6 @@
               <a:t>‹Nº›</a:t>
             </a:fld>
             <a:endParaRPr lang="es-CL"/>
-          </a:p>
-        </p:txBody>
-      </p:sp>
-      <p:sp>
-        <p:nvSpPr>
-          <p:cNvPr id="7" name="Title 6"/>
-          <p:cNvSpPr>
-            <a:spLocks noGrp="1"/>
-          </p:cNvSpPr>
-          <p:nvPr>
-            <p:ph type="title"/>
-          </p:nvPr>
-        </p:nvSpPr>
-        <p:spPr/>
-        <p:txBody>
-          <a:bodyPr/>
-          <a:lstStyle/>
-          <a:p>
-            <a:r>
-              <a:rPr lang="es-ES" smtClean="0"/>
-              <a:t>Haga clic para modificar el estilo de título del patrón</a:t>
-            </a:r>
-            <a:endParaRPr lang="en-US"/>
           </a:p>
         </p:txBody>
       </p:sp>
@@ -1073,7 +866,7 @@
 </file>
 
 <file path=ppt/slideLayouts/slideLayout3.xml><?xml version="1.0" encoding="utf-8"?>
-<p:sldLayout xmlns:a="http://schemas.openxmlformats.org/drawingml/2006/main" xmlns:r="http://schemas.openxmlformats.org/officeDocument/2006/relationships" xmlns:p="http://schemas.openxmlformats.org/presentationml/2006/main" showMasterSp="0" type="secHead" preserve="1">
+<p:sldLayout xmlns:a="http://schemas.openxmlformats.org/drawingml/2006/main" xmlns:r="http://schemas.openxmlformats.org/officeDocument/2006/relationships" xmlns:p="http://schemas.openxmlformats.org/presentationml/2006/main" type="secHead" preserve="1">
   <p:cSld name="Encabezado de sección">
     <p:spTree>
       <p:nvGrpSpPr>
@@ -1091,93 +884,33 @@
       </p:grpSpPr>
       <p:sp>
         <p:nvSpPr>
-          <p:cNvPr id="7" name="Rectangle 6"/>
-          <p:cNvSpPr/>
-          <p:nvPr/>
-        </p:nvSpPr>
-        <p:spPr>
-          <a:xfrm>
-            <a:off x="7010400" y="152399"/>
-            <a:ext cx="1981200" cy="6556248"/>
-          </a:xfrm>
-          <a:prstGeom prst="rect">
-            <a:avLst/>
-          </a:prstGeom>
-          <a:solidFill>
-            <a:schemeClr val="tx2"/>
-          </a:solidFill>
-          <a:ln>
-            <a:noFill/>
-          </a:ln>
-        </p:spPr>
-        <p:style>
-          <a:lnRef idx="2">
-            <a:schemeClr val="accent1">
-              <a:shade val="50000"/>
-            </a:schemeClr>
-          </a:lnRef>
-          <a:fillRef idx="1">
-            <a:schemeClr val="accent1"/>
-          </a:fillRef>
-          <a:effectRef idx="0">
-            <a:schemeClr val="accent1"/>
-          </a:effectRef>
-          <a:fontRef idx="minor">
-            <a:schemeClr val="lt1"/>
-          </a:fontRef>
-        </p:style>
-        <p:txBody>
-          <a:bodyPr rtlCol="0" anchor="ctr"/>
-          <a:lstStyle/>
-          <a:p>
-            <a:pPr algn="ctr"/>
-            <a:endParaRPr lang="en-US"/>
-          </a:p>
-        </p:txBody>
-      </p:sp>
-      <p:sp>
-        <p:nvSpPr>
-          <p:cNvPr id="8" name="Rectangle 7"/>
-          <p:cNvSpPr/>
-          <p:nvPr/>
-        </p:nvSpPr>
-        <p:spPr>
-          <a:xfrm>
-            <a:off x="152400" y="153923"/>
-            <a:ext cx="6705600" cy="6553200"/>
-          </a:xfrm>
-          <a:prstGeom prst="rect">
-            <a:avLst/>
-          </a:prstGeom>
-          <a:solidFill>
-            <a:schemeClr val="accent1"/>
-          </a:solidFill>
-          <a:ln>
-            <a:noFill/>
-          </a:ln>
-        </p:spPr>
-        <p:style>
-          <a:lnRef idx="2">
-            <a:schemeClr val="accent1">
-              <a:shade val="50000"/>
-            </a:schemeClr>
-          </a:lnRef>
-          <a:fillRef idx="1">
-            <a:schemeClr val="accent1"/>
-          </a:fillRef>
-          <a:effectRef idx="0">
-            <a:schemeClr val="accent1"/>
-          </a:effectRef>
-          <a:fontRef idx="minor">
-            <a:schemeClr val="lt1"/>
-          </a:fontRef>
-        </p:style>
-        <p:txBody>
-          <a:bodyPr rtlCol="0" anchor="ctr"/>
-          <a:lstStyle/>
-          <a:p>
-            <a:pPr algn="ctr"/>
-            <a:endParaRPr lang="en-US"/>
+          <p:cNvPr id="2" name="Title 1"/>
+          <p:cNvSpPr>
+            <a:spLocks noGrp="1"/>
+          </p:cNvSpPr>
+          <p:nvPr>
+            <p:ph type="title"/>
+          </p:nvPr>
+        </p:nvSpPr>
+        <p:spPr>
+          <a:xfrm>
+            <a:off x="722313" y="5486400"/>
+            <a:ext cx="7659687" cy="1168400"/>
+          </a:xfrm>
+        </p:spPr>
+        <p:txBody>
+          <a:bodyPr anchor="t"/>
+          <a:lstStyle>
+            <a:lvl1pPr algn="l">
+              <a:defRPr sz="3600" b="0" cap="all"/>
+            </a:lvl1pPr>
+          </a:lstStyle>
+          <a:p>
+            <a:r>
+              <a:rPr lang="es-ES" smtClean="0"/>
+              <a:t>Haga clic para modificar el estilo de título del patrón</a:t>
+            </a:r>
+            <a:endParaRPr lang="en-US" dirty="0"/>
           </a:p>
         </p:txBody>
       </p:sp>
@@ -1193,18 +926,20 @@
         </p:nvSpPr>
         <p:spPr>
           <a:xfrm>
-            <a:off x="7162799" y="2892277"/>
-            <a:ext cx="1600201" cy="1645920"/>
-          </a:xfrm>
-        </p:spPr>
-        <p:txBody>
-          <a:bodyPr anchor="ctr"/>
+            <a:off x="722313" y="3852863"/>
+            <a:ext cx="6135687" cy="1633538"/>
+          </a:xfrm>
+        </p:spPr>
+        <p:txBody>
+          <a:bodyPr anchor="b"/>
           <a:lstStyle>
             <a:lvl1pPr marL="0" indent="0">
               <a:buNone/>
               <a:defRPr sz="2000">
                 <a:solidFill>
-                  <a:schemeClr val="bg2"/>
+                  <a:schemeClr val="tx1">
+                    <a:tint val="75000"/>
+                  </a:schemeClr>
                 </a:solidFill>
               </a:defRPr>
             </a:lvl1pPr>
@@ -1300,7 +1035,7 @@
       </p:sp>
       <p:sp>
         <p:nvSpPr>
-          <p:cNvPr id="9" name="Date Placeholder 8"/>
+          <p:cNvPr id="4" name="Date Placeholder 3"/>
           <p:cNvSpPr>
             <a:spLocks noGrp="1"/>
           </p:cNvSpPr>
@@ -1311,19 +1046,11 @@
         <p:spPr/>
         <p:txBody>
           <a:bodyPr/>
-          <a:lstStyle>
-            <a:lvl1pPr>
-              <a:defRPr>
-                <a:solidFill>
-                  <a:srgbClr val="FFFFFF"/>
-                </a:solidFill>
-              </a:defRPr>
-            </a:lvl1pPr>
-          </a:lstStyle>
+          <a:lstStyle/>
           <a:p>
             <a:fld id="{6E623EF4-7B94-4DE9-BEA9-6E505CCCEE3B}" type="datetimeFigureOut">
               <a:rPr lang="es-CL" smtClean="0"/>
-              <a:t>05-09-2016</a:t>
+              <a:t>06-09-2016</a:t>
             </a:fld>
             <a:endParaRPr lang="es-CL"/>
           </a:p>
@@ -1331,91 +1058,43 @@
       </p:sp>
       <p:sp>
         <p:nvSpPr>
-          <p:cNvPr id="10" name="Slide Number Placeholder 9"/>
-          <p:cNvSpPr>
-            <a:spLocks noGrp="1"/>
-          </p:cNvSpPr>
-          <p:nvPr>
-            <p:ph type="sldNum" sz="quarter" idx="11"/>
+          <p:cNvPr id="5" name="Footer Placeholder 4"/>
+          <p:cNvSpPr>
+            <a:spLocks noGrp="1"/>
+          </p:cNvSpPr>
+          <p:nvPr>
+            <p:ph type="ftr" sz="quarter" idx="11"/>
           </p:nvPr>
         </p:nvSpPr>
         <p:spPr/>
         <p:txBody>
           <a:bodyPr/>
-          <a:lstStyle>
-            <a:lvl1pPr>
-              <a:defRPr>
-                <a:solidFill>
-                  <a:schemeClr val="bg2"/>
-                </a:solidFill>
-              </a:defRPr>
-            </a:lvl1pPr>
-          </a:lstStyle>
+          <a:lstStyle/>
+          <a:p>
+            <a:endParaRPr lang="es-CL"/>
+          </a:p>
+        </p:txBody>
+      </p:sp>
+      <p:sp>
+        <p:nvSpPr>
+          <p:cNvPr id="6" name="Slide Number Placeholder 5"/>
+          <p:cNvSpPr>
+            <a:spLocks noGrp="1"/>
+          </p:cNvSpPr>
+          <p:nvPr>
+            <p:ph type="sldNum" sz="quarter" idx="12"/>
+          </p:nvPr>
+        </p:nvSpPr>
+        <p:spPr/>
+        <p:txBody>
+          <a:bodyPr/>
+          <a:lstStyle/>
           <a:p>
             <a:fld id="{B86FBE9E-6D20-44CB-A392-46B1E8398966}" type="slidenum">
               <a:rPr lang="es-CL" smtClean="0"/>
               <a:t>‹Nº›</a:t>
             </a:fld>
             <a:endParaRPr lang="es-CL"/>
-          </a:p>
-        </p:txBody>
-      </p:sp>
-      <p:sp>
-        <p:nvSpPr>
-          <p:cNvPr id="11" name="Footer Placeholder 10"/>
-          <p:cNvSpPr>
-            <a:spLocks noGrp="1"/>
-          </p:cNvSpPr>
-          <p:nvPr>
-            <p:ph type="ftr" sz="quarter" idx="12"/>
-          </p:nvPr>
-        </p:nvSpPr>
-        <p:spPr/>
-        <p:txBody>
-          <a:bodyPr/>
-          <a:lstStyle>
-            <a:lvl1pPr>
-              <a:defRPr>
-                <a:solidFill>
-                  <a:srgbClr val="FFFFFF"/>
-                </a:solidFill>
-              </a:defRPr>
-            </a:lvl1pPr>
-          </a:lstStyle>
-          <a:p>
-            <a:endParaRPr lang="es-CL"/>
-          </a:p>
-        </p:txBody>
-      </p:sp>
-      <p:sp>
-        <p:nvSpPr>
-          <p:cNvPr id="12" name="Title 11"/>
-          <p:cNvSpPr>
-            <a:spLocks noGrp="1"/>
-          </p:cNvSpPr>
-          <p:nvPr>
-            <p:ph type="title"/>
-          </p:nvPr>
-        </p:nvSpPr>
-        <p:spPr>
-          <a:xfrm>
-            <a:off x="381000" y="2892277"/>
-            <a:ext cx="6324600" cy="1645920"/>
-          </a:xfrm>
-        </p:spPr>
-        <p:txBody>
-          <a:bodyPr/>
-          <a:lstStyle>
-            <a:lvl1pPr algn="r">
-              <a:defRPr sz="4200" spc="150" baseline="0"/>
-            </a:lvl1pPr>
-          </a:lstStyle>
-          <a:p>
-            <a:r>
-              <a:rPr lang="es-ES" smtClean="0"/>
-              <a:t>Haga clic para modificar el estilo de título del patrón</a:t>
-            </a:r>
-            <a:endParaRPr lang="en-US" dirty="0"/>
           </a:p>
         </p:txBody>
       </p:sp>
@@ -1446,6 +1125,29 @@
       </p:grpSpPr>
       <p:sp>
         <p:nvSpPr>
+          <p:cNvPr id="2" name="Title 1"/>
+          <p:cNvSpPr>
+            <a:spLocks noGrp="1"/>
+          </p:cNvSpPr>
+          <p:nvPr>
+            <p:ph type="title"/>
+          </p:nvPr>
+        </p:nvSpPr>
+        <p:spPr/>
+        <p:txBody>
+          <a:bodyPr/>
+          <a:lstStyle/>
+          <a:p>
+            <a:r>
+              <a:rPr lang="es-ES" smtClean="0"/>
+              <a:t>Haga clic para modificar el estilo de título del patrón</a:t>
+            </a:r>
+            <a:endParaRPr lang="en-US"/>
+          </a:p>
+        </p:txBody>
+      </p:sp>
+      <p:sp>
+        <p:nvSpPr>
           <p:cNvPr id="3" name="Content Placeholder 2"/>
           <p:cNvSpPr>
             <a:spLocks noGrp="1"/>
@@ -1456,8 +1158,8 @@
         </p:nvSpPr>
         <p:spPr>
           <a:xfrm>
-            <a:off x="457200" y="1719072"/>
-            <a:ext cx="4038600" cy="4407408"/>
+            <a:off x="457200" y="1536192"/>
+            <a:ext cx="3657600" cy="4590288"/>
           </a:xfrm>
         </p:spPr>
         <p:txBody>
@@ -1541,8 +1243,8 @@
         </p:nvSpPr>
         <p:spPr>
           <a:xfrm>
-            <a:off x="4648200" y="1719072"/>
-            <a:ext cx="4038600" cy="4407408"/>
+            <a:off x="4419600" y="1536192"/>
+            <a:ext cx="3657600" cy="4590288"/>
           </a:xfrm>
         </p:spPr>
         <p:txBody>
@@ -1631,7 +1333,7 @@
           <a:p>
             <a:fld id="{6E623EF4-7B94-4DE9-BEA9-6E505CCCEE3B}" type="datetimeFigureOut">
               <a:rPr lang="es-CL" smtClean="0"/>
-              <a:t>05-09-2016</a:t>
+              <a:t>06-09-2016</a:t>
             </a:fld>
             <a:endParaRPr lang="es-CL"/>
           </a:p>
@@ -1676,29 +1378,6 @@
               <a:t>‹Nº›</a:t>
             </a:fld>
             <a:endParaRPr lang="es-CL"/>
-          </a:p>
-        </p:txBody>
-      </p:sp>
-      <p:sp>
-        <p:nvSpPr>
-          <p:cNvPr id="8" name="Title 7"/>
-          <p:cNvSpPr>
-            <a:spLocks noGrp="1"/>
-          </p:cNvSpPr>
-          <p:nvPr>
-            <p:ph type="title"/>
-          </p:nvPr>
-        </p:nvSpPr>
-        <p:spPr/>
-        <p:txBody>
-          <a:bodyPr/>
-          <a:lstStyle/>
-          <a:p>
-            <a:r>
-              <a:rPr lang="es-ES" smtClean="0"/>
-              <a:t>Haga clic para modificar el estilo de título del patrón</a:t>
-            </a:r>
-            <a:endParaRPr lang="en-US"/>
           </a:p>
         </p:txBody>
       </p:sp>
@@ -1729,6 +1408,33 @@
       </p:grpSpPr>
       <p:sp>
         <p:nvSpPr>
+          <p:cNvPr id="2" name="Title 1"/>
+          <p:cNvSpPr>
+            <a:spLocks noGrp="1"/>
+          </p:cNvSpPr>
+          <p:nvPr>
+            <p:ph type="title"/>
+          </p:nvPr>
+        </p:nvSpPr>
+        <p:spPr/>
+        <p:txBody>
+          <a:bodyPr/>
+          <a:lstStyle>
+            <a:lvl1pPr>
+              <a:defRPr/>
+            </a:lvl1pPr>
+          </a:lstStyle>
+          <a:p>
+            <a:r>
+              <a:rPr lang="es-ES" smtClean="0"/>
+              <a:t>Haga clic para modificar el estilo de título del patrón</a:t>
+            </a:r>
+            <a:endParaRPr lang="en-US"/>
+          </a:p>
+        </p:txBody>
+      </p:sp>
+      <p:sp>
+        <p:nvSpPr>
           <p:cNvPr id="3" name="Text Placeholder 2"/>
           <p:cNvSpPr>
             <a:spLocks noGrp="1"/>
@@ -1739,16 +1445,18 @@
         </p:nvSpPr>
         <p:spPr>
           <a:xfrm>
-            <a:off x="457200" y="1722438"/>
-            <a:ext cx="4040188" cy="639762"/>
-          </a:xfrm>
-        </p:spPr>
-        <p:txBody>
-          <a:bodyPr anchor="b"/>
+            <a:off x="457200" y="1535113"/>
+            <a:ext cx="3657600" cy="639762"/>
+          </a:xfrm>
+        </p:spPr>
+        <p:txBody>
+          <a:bodyPr anchor="b">
+            <a:noAutofit/>
+          </a:bodyPr>
           <a:lstStyle>
             <a:lvl1pPr marL="0" indent="0" algn="ctr">
               <a:buNone/>
-              <a:defRPr sz="2400" b="0">
+              <a:defRPr sz="2000" b="1">
                 <a:solidFill>
                   <a:schemeClr val="tx2"/>
                 </a:solidFill>
@@ -1808,8 +1516,8 @@
         </p:nvSpPr>
         <p:spPr>
           <a:xfrm>
-            <a:off x="457200" y="2438399"/>
-            <a:ext cx="4040188" cy="3687763"/>
+            <a:off x="457200" y="2174875"/>
+            <a:ext cx="3657600" cy="3951288"/>
           </a:xfrm>
         </p:spPr>
         <p:txBody>
@@ -1893,16 +1601,18 @@
         </p:nvSpPr>
         <p:spPr>
           <a:xfrm>
-            <a:off x="4645025" y="1722438"/>
-            <a:ext cx="4041775" cy="639762"/>
-          </a:xfrm>
-        </p:spPr>
-        <p:txBody>
-          <a:bodyPr anchor="b"/>
+            <a:off x="4419600" y="1535113"/>
+            <a:ext cx="3657600" cy="639762"/>
+          </a:xfrm>
+        </p:spPr>
+        <p:txBody>
+          <a:bodyPr anchor="b">
+            <a:noAutofit/>
+          </a:bodyPr>
           <a:lstStyle>
             <a:lvl1pPr marL="0" indent="0" algn="ctr">
               <a:buNone/>
-              <a:defRPr sz="2400" b="0">
+              <a:defRPr sz="2000" b="1">
                 <a:solidFill>
                   <a:schemeClr val="tx2"/>
                 </a:solidFill>
@@ -1962,8 +1672,8 @@
         </p:nvSpPr>
         <p:spPr>
           <a:xfrm>
-            <a:off x="4645025" y="2438399"/>
-            <a:ext cx="4041775" cy="3687763"/>
+            <a:off x="4419600" y="2174875"/>
+            <a:ext cx="3657600" cy="3951288"/>
           </a:xfrm>
         </p:spPr>
         <p:txBody>
@@ -2031,7 +1741,7 @@
               <a:rPr lang="es-ES" smtClean="0"/>
               <a:t>Quinto nivel</a:t>
             </a:r>
-            <a:endParaRPr lang="en-US" dirty="0"/>
+            <a:endParaRPr lang="en-US"/>
           </a:p>
         </p:txBody>
       </p:sp>
@@ -2052,7 +1762,7 @@
           <a:p>
             <a:fld id="{6E623EF4-7B94-4DE9-BEA9-6E505CCCEE3B}" type="datetimeFigureOut">
               <a:rPr lang="es-CL" smtClean="0"/>
-              <a:t>05-09-2016</a:t>
+              <a:t>06-09-2016</a:t>
             </a:fld>
             <a:endParaRPr lang="es-CL"/>
           </a:p>
@@ -2097,29 +1807,6 @@
               <a:t>‹Nº›</a:t>
             </a:fld>
             <a:endParaRPr lang="es-CL"/>
-          </a:p>
-        </p:txBody>
-      </p:sp>
-      <p:sp>
-        <p:nvSpPr>
-          <p:cNvPr id="10" name="Title 9"/>
-          <p:cNvSpPr>
-            <a:spLocks noGrp="1"/>
-          </p:cNvSpPr>
-          <p:nvPr>
-            <p:ph type="title"/>
-          </p:nvPr>
-        </p:nvSpPr>
-        <p:spPr/>
-        <p:txBody>
-          <a:bodyPr/>
-          <a:lstStyle/>
-          <a:p>
-            <a:r>
-              <a:rPr lang="es-ES" smtClean="0"/>
-              <a:t>Haga clic para modificar el estilo de título del patrón</a:t>
-            </a:r>
-            <a:endParaRPr lang="en-US"/>
           </a:p>
         </p:txBody>
       </p:sp>
@@ -2150,6 +1837,29 @@
       </p:grpSpPr>
       <p:sp>
         <p:nvSpPr>
+          <p:cNvPr id="2" name="Title 1"/>
+          <p:cNvSpPr>
+            <a:spLocks noGrp="1"/>
+          </p:cNvSpPr>
+          <p:nvPr>
+            <p:ph type="title"/>
+          </p:nvPr>
+        </p:nvSpPr>
+        <p:spPr/>
+        <p:txBody>
+          <a:bodyPr/>
+          <a:lstStyle/>
+          <a:p>
+            <a:r>
+              <a:rPr lang="es-ES" smtClean="0"/>
+              <a:t>Haga clic para modificar el estilo de título del patrón</a:t>
+            </a:r>
+            <a:endParaRPr lang="en-US"/>
+          </a:p>
+        </p:txBody>
+      </p:sp>
+      <p:sp>
+        <p:nvSpPr>
           <p:cNvPr id="3" name="Date Placeholder 2"/>
           <p:cNvSpPr>
             <a:spLocks noGrp="1"/>
@@ -2165,7 +1875,7 @@
           <a:p>
             <a:fld id="{6E623EF4-7B94-4DE9-BEA9-6E505CCCEE3B}" type="datetimeFigureOut">
               <a:rPr lang="es-CL" smtClean="0"/>
-              <a:t>05-09-2016</a:t>
+              <a:t>06-09-2016</a:t>
             </a:fld>
             <a:endParaRPr lang="es-CL"/>
           </a:p>
@@ -2210,29 +1920,6 @@
               <a:t>‹Nº›</a:t>
             </a:fld>
             <a:endParaRPr lang="es-CL"/>
-          </a:p>
-        </p:txBody>
-      </p:sp>
-      <p:sp>
-        <p:nvSpPr>
-          <p:cNvPr id="6" name="Title 5"/>
-          <p:cNvSpPr>
-            <a:spLocks noGrp="1"/>
-          </p:cNvSpPr>
-          <p:nvPr>
-            <p:ph type="title"/>
-          </p:nvPr>
-        </p:nvSpPr>
-        <p:spPr/>
-        <p:txBody>
-          <a:bodyPr/>
-          <a:lstStyle/>
-          <a:p>
-            <a:r>
-              <a:rPr lang="es-ES" smtClean="0"/>
-              <a:t>Haga clic para modificar el estilo de título del patrón</a:t>
-            </a:r>
-            <a:endParaRPr lang="en-US"/>
           </a:p>
         </p:txBody>
       </p:sp>
@@ -2245,7 +1932,7 @@
 </file>
 
 <file path=ppt/slideLayouts/slideLayout7.xml><?xml version="1.0" encoding="utf-8"?>
-<p:sldLayout xmlns:a="http://schemas.openxmlformats.org/drawingml/2006/main" xmlns:r="http://schemas.openxmlformats.org/officeDocument/2006/relationships" xmlns:p="http://schemas.openxmlformats.org/presentationml/2006/main" showMasterSp="0" type="blank" preserve="1">
+<p:sldLayout xmlns:a="http://schemas.openxmlformats.org/drawingml/2006/main" xmlns:r="http://schemas.openxmlformats.org/officeDocument/2006/relationships" xmlns:p="http://schemas.openxmlformats.org/presentationml/2006/main" type="blank" preserve="1">
   <p:cSld name="En blanco">
     <p:spTree>
       <p:nvGrpSpPr>
@@ -2263,52 +1950,6 @@
       </p:grpSpPr>
       <p:sp>
         <p:nvSpPr>
-          <p:cNvPr id="5" name="Rectangle 4"/>
-          <p:cNvSpPr/>
-          <p:nvPr/>
-        </p:nvSpPr>
-        <p:spPr>
-          <a:xfrm>
-            <a:off x="152400" y="150919"/>
-            <a:ext cx="8831802" cy="6556248"/>
-          </a:xfrm>
-          <a:prstGeom prst="rect">
-            <a:avLst/>
-          </a:prstGeom>
-          <a:solidFill>
-            <a:schemeClr val="bg2"/>
-          </a:solidFill>
-          <a:ln>
-            <a:noFill/>
-          </a:ln>
-        </p:spPr>
-        <p:style>
-          <a:lnRef idx="2">
-            <a:schemeClr val="accent1">
-              <a:shade val="50000"/>
-            </a:schemeClr>
-          </a:lnRef>
-          <a:fillRef idx="1">
-            <a:schemeClr val="accent1"/>
-          </a:fillRef>
-          <a:effectRef idx="0">
-            <a:schemeClr val="accent1"/>
-          </a:effectRef>
-          <a:fontRef idx="minor">
-            <a:schemeClr val="lt1"/>
-          </a:fontRef>
-        </p:style>
-        <p:txBody>
-          <a:bodyPr rtlCol="0" anchor="ctr"/>
-          <a:lstStyle/>
-          <a:p>
-            <a:pPr algn="ctr"/>
-            <a:endParaRPr lang="en-US"/>
-          </a:p>
-        </p:txBody>
-      </p:sp>
-      <p:sp>
-        <p:nvSpPr>
           <p:cNvPr id="2" name="Date Placeholder 1"/>
           <p:cNvSpPr>
             <a:spLocks noGrp="1"/>
@@ -2324,7 +1965,7 @@
           <a:p>
             <a:fld id="{6E623EF4-7B94-4DE9-BEA9-6E505CCCEE3B}" type="datetimeFigureOut">
               <a:rPr lang="es-CL" smtClean="0"/>
-              <a:t>05-09-2016</a:t>
+              <a:t>06-09-2016</a:t>
             </a:fld>
             <a:endParaRPr lang="es-CL"/>
           </a:p>
@@ -2381,13 +2022,8 @@
 </file>
 
 <file path=ppt/slideLayouts/slideLayout8.xml><?xml version="1.0" encoding="utf-8"?>
-<p:sldLayout xmlns:a="http://schemas.openxmlformats.org/drawingml/2006/main" xmlns:r="http://schemas.openxmlformats.org/officeDocument/2006/relationships" xmlns:p="http://schemas.openxmlformats.org/presentationml/2006/main" showMasterSp="0" type="objTx" preserve="1">
+<p:sldLayout xmlns:a="http://schemas.openxmlformats.org/drawingml/2006/main" xmlns:r="http://schemas.openxmlformats.org/officeDocument/2006/relationships" xmlns:p="http://schemas.openxmlformats.org/presentationml/2006/main" type="objTx" preserve="1">
   <p:cSld name="Contenido con título">
-    <p:bg>
-      <p:bgRef idx="1001">
-        <a:schemeClr val="bg2"/>
-      </p:bgRef>
-    </p:bg>
     <p:spTree>
       <p:nvGrpSpPr>
         <p:cNvPr id="1" name=""/>
@@ -2404,221 +2040,33 @@
       </p:grpSpPr>
       <p:sp>
         <p:nvSpPr>
-          <p:cNvPr id="10" name="Rectangle 9"/>
-          <p:cNvSpPr/>
-          <p:nvPr/>
-        </p:nvSpPr>
-        <p:spPr>
-          <a:xfrm>
-            <a:off x="0" y="0"/>
-            <a:ext cx="9144000" cy="6858000"/>
-          </a:xfrm>
-          <a:prstGeom prst="rect">
-            <a:avLst/>
-          </a:prstGeom>
-          <a:solidFill>
-            <a:srgbClr val="FFFFFF"/>
-          </a:solidFill>
-          <a:ln>
-            <a:noFill/>
-          </a:ln>
-        </p:spPr>
-        <p:style>
-          <a:lnRef idx="2">
-            <a:schemeClr val="accent1">
-              <a:shade val="50000"/>
-            </a:schemeClr>
-          </a:lnRef>
-          <a:fillRef idx="1">
-            <a:schemeClr val="accent1"/>
-          </a:fillRef>
-          <a:effectRef idx="0">
-            <a:schemeClr val="accent1"/>
-          </a:effectRef>
-          <a:fontRef idx="minor">
-            <a:schemeClr val="lt1"/>
-          </a:fontRef>
-        </p:style>
-        <p:txBody>
-          <a:bodyPr rtlCol="0" anchor="ctr"/>
-          <a:lstStyle/>
-          <a:p>
-            <a:pPr algn="ctr"/>
-            <a:endParaRPr lang="en-US"/>
-          </a:p>
-        </p:txBody>
-      </p:sp>
-      <p:sp>
-        <p:nvSpPr>
-          <p:cNvPr id="8" name="Rectangle 7"/>
-          <p:cNvSpPr/>
-          <p:nvPr/>
-        </p:nvSpPr>
-        <p:spPr>
-          <a:xfrm>
-            <a:off x="7010400" y="150876"/>
-            <a:ext cx="1981200" cy="6556248"/>
-          </a:xfrm>
-          <a:prstGeom prst="rect">
-            <a:avLst/>
-          </a:prstGeom>
-          <a:solidFill>
-            <a:schemeClr val="accent1"/>
-          </a:solidFill>
-          <a:ln>
-            <a:noFill/>
-          </a:ln>
-        </p:spPr>
-        <p:style>
-          <a:lnRef idx="2">
-            <a:schemeClr val="accent1">
-              <a:shade val="50000"/>
-            </a:schemeClr>
-          </a:lnRef>
-          <a:fillRef idx="1">
-            <a:schemeClr val="accent1"/>
-          </a:fillRef>
-          <a:effectRef idx="0">
-            <a:schemeClr val="accent1"/>
-          </a:effectRef>
-          <a:fontRef idx="minor">
-            <a:schemeClr val="lt1"/>
-          </a:fontRef>
-        </p:style>
-        <p:txBody>
-          <a:bodyPr rtlCol="0" anchor="ctr"/>
-          <a:lstStyle/>
-          <a:p>
-            <a:pPr algn="ctr"/>
-            <a:endParaRPr lang="en-US"/>
-          </a:p>
-        </p:txBody>
-      </p:sp>
-      <p:sp useBgFill="1">
-        <p:nvSpPr>
-          <p:cNvPr id="9" name="Rectangle 8"/>
-          <p:cNvSpPr/>
-          <p:nvPr/>
-        </p:nvSpPr>
-        <p:spPr>
-          <a:xfrm>
-            <a:off x="152400" y="152400"/>
-            <a:ext cx="6705600" cy="6553200"/>
-          </a:xfrm>
-          <a:prstGeom prst="rect">
-            <a:avLst/>
-          </a:prstGeom>
-          <a:ln>
-            <a:noFill/>
-          </a:ln>
-        </p:spPr>
-        <p:style>
-          <a:lnRef idx="2">
-            <a:schemeClr val="accent1">
-              <a:shade val="50000"/>
-            </a:schemeClr>
-          </a:lnRef>
-          <a:fillRef idx="1">
-            <a:schemeClr val="accent1"/>
-          </a:fillRef>
-          <a:effectRef idx="0">
-            <a:schemeClr val="accent1"/>
-          </a:effectRef>
-          <a:fontRef idx="minor">
-            <a:schemeClr val="lt1"/>
-          </a:fontRef>
-        </p:style>
-        <p:txBody>
-          <a:bodyPr rtlCol="0" anchor="ctr"/>
-          <a:lstStyle/>
-          <a:p>
-            <a:pPr algn="ctr"/>
-            <a:endParaRPr lang="en-US"/>
-          </a:p>
-        </p:txBody>
-      </p:sp>
-      <p:sp>
-        <p:nvSpPr>
-          <p:cNvPr id="3" name="Content Placeholder 2"/>
-          <p:cNvSpPr>
-            <a:spLocks noGrp="1"/>
-          </p:cNvSpPr>
-          <p:nvPr>
-            <p:ph idx="1"/>
-          </p:nvPr>
-        </p:nvSpPr>
-        <p:spPr>
-          <a:xfrm>
-            <a:off x="609600" y="304800"/>
-            <a:ext cx="5867400" cy="5853113"/>
-          </a:xfrm>
-        </p:spPr>
-        <p:txBody>
-          <a:bodyPr/>
+          <p:cNvPr id="2" name="Title 1"/>
+          <p:cNvSpPr>
+            <a:spLocks noGrp="1"/>
+          </p:cNvSpPr>
+          <p:nvPr>
+            <p:ph type="title"/>
+          </p:nvPr>
+        </p:nvSpPr>
+        <p:spPr>
+          <a:xfrm>
+            <a:off x="304801" y="5495544"/>
+            <a:ext cx="7772400" cy="594360"/>
+          </a:xfrm>
+        </p:spPr>
+        <p:txBody>
+          <a:bodyPr anchor="b"/>
           <a:lstStyle>
-            <a:lvl1pPr>
-              <a:defRPr sz="3200"/>
+            <a:lvl1pPr algn="ctr">
+              <a:defRPr sz="2200" b="1"/>
             </a:lvl1pPr>
-            <a:lvl2pPr>
-              <a:defRPr sz="2800"/>
-            </a:lvl2pPr>
-            <a:lvl3pPr>
-              <a:defRPr sz="2400"/>
-            </a:lvl3pPr>
-            <a:lvl4pPr>
-              <a:defRPr sz="2000"/>
-            </a:lvl4pPr>
-            <a:lvl5pPr>
-              <a:defRPr sz="2000"/>
-            </a:lvl5pPr>
-            <a:lvl6pPr>
-              <a:defRPr sz="2000"/>
-            </a:lvl6pPr>
-            <a:lvl7pPr>
-              <a:defRPr sz="2000"/>
-            </a:lvl7pPr>
-            <a:lvl8pPr>
-              <a:defRPr sz="2000"/>
-            </a:lvl8pPr>
-            <a:lvl9pPr>
-              <a:defRPr sz="2000"/>
-            </a:lvl9pPr>
           </a:lstStyle>
           <a:p>
-            <a:pPr lvl="0"/>
-            <a:r>
-              <a:rPr lang="es-ES" smtClean="0"/>
-              <a:t>Haga clic para modificar el estilo de texto del patrón</a:t>
-            </a:r>
-          </a:p>
-          <a:p>
-            <a:pPr lvl="1"/>
-            <a:r>
-              <a:rPr lang="es-ES" smtClean="0"/>
-              <a:t>Segundo nivel</a:t>
-            </a:r>
-          </a:p>
-          <a:p>
-            <a:pPr lvl="2"/>
-            <a:r>
-              <a:rPr lang="es-ES" smtClean="0"/>
-              <a:t>Tercer nivel</a:t>
-            </a:r>
-          </a:p>
-          <a:p>
-            <a:pPr lvl="3"/>
-            <a:r>
-              <a:rPr lang="es-ES" smtClean="0"/>
-              <a:t>Cuarto nivel</a:t>
-            </a:r>
-          </a:p>
-          <a:p>
-            <a:pPr lvl="4"/>
-            <a:r>
-              <a:rPr lang="es-ES" smtClean="0"/>
-              <a:t>Quinto nivel</a:t>
-            </a:r>
-            <a:endParaRPr lang="en-US"/>
+            <a:r>
+              <a:rPr lang="es-ES" smtClean="0"/>
+              <a:t>Haga clic para modificar el estilo de título del patrón</a:t>
+            </a:r>
+            <a:endParaRPr lang="en-US" dirty="0"/>
           </a:p>
         </p:txBody>
       </p:sp>
@@ -2634,20 +2082,18 @@
         </p:nvSpPr>
         <p:spPr>
           <a:xfrm>
-            <a:off x="7159752" y="2130552"/>
-            <a:ext cx="1673352" cy="2816352"/>
-          </a:xfrm>
-        </p:spPr>
-        <p:txBody>
-          <a:bodyPr tIns="0"/>
+            <a:off x="304799" y="6096000"/>
+            <a:ext cx="7772401" cy="609600"/>
+          </a:xfrm>
+        </p:spPr>
+        <p:txBody>
+          <a:bodyPr>
+            <a:normAutofit/>
+          </a:bodyPr>
           <a:lstStyle>
-            <a:lvl1pPr marL="0" indent="0">
-              <a:buNone/>
-              <a:defRPr sz="1400">
-                <a:solidFill>
-                  <a:srgbClr val="FFFFFF"/>
-                </a:solidFill>
-              </a:defRPr>
+            <a:lvl1pPr marL="0" indent="0" algn="ctr">
+              <a:buNone/>
+              <a:defRPr sz="1600"/>
             </a:lvl1pPr>
             <a:lvl2pPr marL="457200" indent="0">
               <a:buNone/>
@@ -2708,7 +2154,7 @@
           <a:p>
             <a:fld id="{6E623EF4-7B94-4DE9-BEA9-6E505CCCEE3B}" type="datetimeFigureOut">
               <a:rPr lang="es-CL" smtClean="0"/>
-              <a:t>05-09-2016</a:t>
+              <a:t>06-09-2016</a:t>
             </a:fld>
             <a:endParaRPr lang="es-CL"/>
           </a:p>
@@ -2743,22 +2189,10 @@
             <p:ph type="sldNum" sz="quarter" idx="12"/>
           </p:nvPr>
         </p:nvSpPr>
-        <p:spPr>
-          <a:ln>
-            <a:noFill/>
-          </a:ln>
-        </p:spPr>
+        <p:spPr/>
         <p:txBody>
           <a:bodyPr/>
-          <a:lstStyle>
-            <a:lvl1pPr>
-              <a:defRPr>
-                <a:solidFill>
-                  <a:srgbClr val="FFFFFF"/>
-                </a:solidFill>
-              </a:defRPr>
-            </a:lvl1pPr>
-          </a:lstStyle>
+          <a:lstStyle/>
           <a:p>
             <a:fld id="{B86FBE9E-6D20-44CB-A392-46B1E8398966}" type="slidenum">
               <a:rPr lang="es-CL" smtClean="0"/>
@@ -2770,52 +2204,72 @@
       </p:sp>
       <p:sp>
         <p:nvSpPr>
-          <p:cNvPr id="11" name="Title 10"/>
-          <p:cNvSpPr>
-            <a:spLocks noGrp="1"/>
-          </p:cNvSpPr>
-          <p:nvPr>
-            <p:ph type="title"/>
-          </p:nvPr>
-        </p:nvSpPr>
-        <p:spPr>
-          <a:xfrm>
-            <a:off x="7159752" y="457200"/>
-            <a:ext cx="1675660" cy="1673352"/>
-          </a:xfrm>
-        </p:spPr>
-        <p:txBody>
-          <a:bodyPr anchor="b"/>
-          <a:lstStyle>
-            <a:lvl1pPr algn="l">
-              <a:defRPr sz="2000" spc="150" baseline="0"/>
-            </a:lvl1pPr>
-          </a:lstStyle>
-          <a:p>
-            <a:r>
-              <a:rPr lang="es-ES" smtClean="0"/>
-              <a:t>Haga clic para modificar el estilo de título del patrón</a:t>
-            </a:r>
-            <a:endParaRPr lang="en-US" dirty="0"/>
+          <p:cNvPr id="9" name="Content Placeholder 8"/>
+          <p:cNvSpPr>
+            <a:spLocks noGrp="1"/>
+          </p:cNvSpPr>
+          <p:nvPr>
+            <p:ph sz="quarter" idx="13"/>
+          </p:nvPr>
+        </p:nvSpPr>
+        <p:spPr>
+          <a:xfrm>
+            <a:off x="304800" y="381000"/>
+            <a:ext cx="7772400" cy="4942840"/>
+          </a:xfrm>
+        </p:spPr>
+        <p:txBody>
+          <a:bodyPr/>
+          <a:lstStyle/>
+          <a:p>
+            <a:pPr lvl="0"/>
+            <a:r>
+              <a:rPr lang="es-ES" smtClean="0"/>
+              <a:t>Haga clic para modificar el estilo de texto del patrón</a:t>
+            </a:r>
+          </a:p>
+          <a:p>
+            <a:pPr lvl="1"/>
+            <a:r>
+              <a:rPr lang="es-ES" smtClean="0"/>
+              <a:t>Segundo nivel</a:t>
+            </a:r>
+          </a:p>
+          <a:p>
+            <a:pPr lvl="2"/>
+            <a:r>
+              <a:rPr lang="es-ES" smtClean="0"/>
+              <a:t>Tercer nivel</a:t>
+            </a:r>
+          </a:p>
+          <a:p>
+            <a:pPr lvl="3"/>
+            <a:r>
+              <a:rPr lang="es-ES" smtClean="0"/>
+              <a:t>Cuarto nivel</a:t>
+            </a:r>
+          </a:p>
+          <a:p>
+            <a:pPr lvl="4"/>
+            <a:r>
+              <a:rPr lang="es-ES" smtClean="0"/>
+              <a:t>Quinto nivel</a:t>
+            </a:r>
+            <a:endParaRPr lang="en-US"/>
           </a:p>
         </p:txBody>
       </p:sp>
     </p:spTree>
   </p:cSld>
   <p:clrMapOvr>
-    <a:overrideClrMapping bg1="lt1" tx1="dk1" bg2="lt2" tx2="dk2" accent1="accent1" accent2="accent2" accent3="accent3" accent4="accent4" accent5="accent5" accent6="accent6" hlink="hlink" folHlink="folHlink"/>
+    <a:masterClrMapping/>
   </p:clrMapOvr>
 </p:sldLayout>
 </file>
 
 <file path=ppt/slideLayouts/slideLayout9.xml><?xml version="1.0" encoding="utf-8"?>
-<p:sldLayout xmlns:a="http://schemas.openxmlformats.org/drawingml/2006/main" xmlns:r="http://schemas.openxmlformats.org/officeDocument/2006/relationships" xmlns:p="http://schemas.openxmlformats.org/presentationml/2006/main" showMasterSp="0" type="picTx" preserve="1">
+<p:sldLayout xmlns:a="http://schemas.openxmlformats.org/drawingml/2006/main" xmlns:r="http://schemas.openxmlformats.org/officeDocument/2006/relationships" xmlns:p="http://schemas.openxmlformats.org/presentationml/2006/main" type="picTx" preserve="1">
   <p:cSld name="Imagen con título">
-    <p:bg>
-      <p:bgRef idx="1001">
-        <a:schemeClr val="bg2"/>
-      </p:bgRef>
-    </p:bg>
     <p:spTree>
       <p:nvGrpSpPr>
         <p:cNvPr id="1" name=""/>
@@ -2832,295 +2286,7 @@
       </p:grpSpPr>
       <p:sp>
         <p:nvSpPr>
-          <p:cNvPr id="8" name="Rectangle 7"/>
-          <p:cNvSpPr/>
-          <p:nvPr/>
-        </p:nvSpPr>
-        <p:spPr>
-          <a:xfrm>
-            <a:off x="0" y="0"/>
-            <a:ext cx="9144000" cy="6858000"/>
-          </a:xfrm>
-          <a:prstGeom prst="rect">
-            <a:avLst/>
-          </a:prstGeom>
-          <a:solidFill>
-            <a:srgbClr val="FFFFFF"/>
-          </a:solidFill>
-          <a:ln>
-            <a:noFill/>
-          </a:ln>
-        </p:spPr>
-        <p:style>
-          <a:lnRef idx="2">
-            <a:schemeClr val="accent1">
-              <a:shade val="50000"/>
-            </a:schemeClr>
-          </a:lnRef>
-          <a:fillRef idx="1">
-            <a:schemeClr val="accent1"/>
-          </a:fillRef>
-          <a:effectRef idx="0">
-            <a:schemeClr val="accent1"/>
-          </a:effectRef>
-          <a:fontRef idx="minor">
-            <a:schemeClr val="lt1"/>
-          </a:fontRef>
-        </p:style>
-        <p:txBody>
-          <a:bodyPr rtlCol="0" anchor="ctr"/>
-          <a:lstStyle/>
-          <a:p>
-            <a:pPr algn="ctr"/>
-            <a:endParaRPr lang="en-US"/>
-          </a:p>
-        </p:txBody>
-      </p:sp>
-      <p:sp useBgFill="1">
-        <p:nvSpPr>
-          <p:cNvPr id="9" name="Rectangle 8"/>
-          <p:cNvSpPr/>
-          <p:nvPr/>
-        </p:nvSpPr>
-        <p:spPr>
-          <a:xfrm>
-            <a:off x="7010400" y="150876"/>
-            <a:ext cx="1981200" cy="6556248"/>
-          </a:xfrm>
-          <a:prstGeom prst="rect">
-            <a:avLst/>
-          </a:prstGeom>
-          <a:ln>
-            <a:noFill/>
-          </a:ln>
-        </p:spPr>
-        <p:style>
-          <a:lnRef idx="2">
-            <a:schemeClr val="accent1">
-              <a:shade val="50000"/>
-            </a:schemeClr>
-          </a:lnRef>
-          <a:fillRef idx="1">
-            <a:schemeClr val="accent1"/>
-          </a:fillRef>
-          <a:effectRef idx="0">
-            <a:schemeClr val="accent1"/>
-          </a:effectRef>
-          <a:fontRef idx="minor">
-            <a:schemeClr val="lt1"/>
-          </a:fontRef>
-        </p:style>
-        <p:txBody>
-          <a:bodyPr rtlCol="0" anchor="ctr"/>
-          <a:lstStyle/>
-          <a:p>
-            <a:pPr algn="ctr"/>
-            <a:endParaRPr lang="en-US"/>
-          </a:p>
-        </p:txBody>
-      </p:sp>
-      <p:sp>
-        <p:nvSpPr>
-          <p:cNvPr id="3" name="Picture Placeholder 2"/>
-          <p:cNvSpPr>
-            <a:spLocks noGrp="1"/>
-          </p:cNvSpPr>
-          <p:nvPr>
-            <p:ph type="pic" idx="1"/>
-          </p:nvPr>
-        </p:nvSpPr>
-        <p:spPr>
-          <a:xfrm>
-            <a:off x="152400" y="152400"/>
-            <a:ext cx="6705600" cy="6553200"/>
-          </a:xfrm>
-        </p:spPr>
-        <p:txBody>
-          <a:bodyPr anchor="ctr"/>
-          <a:lstStyle>
-            <a:lvl1pPr marL="0" indent="0" algn="ctr">
-              <a:buNone/>
-              <a:defRPr sz="3200"/>
-            </a:lvl1pPr>
-            <a:lvl2pPr marL="457200" indent="0">
-              <a:buNone/>
-              <a:defRPr sz="2800"/>
-            </a:lvl2pPr>
-            <a:lvl3pPr marL="914400" indent="0">
-              <a:buNone/>
-              <a:defRPr sz="2400"/>
-            </a:lvl3pPr>
-            <a:lvl4pPr marL="1371600" indent="0">
-              <a:buNone/>
-              <a:defRPr sz="2000"/>
-            </a:lvl4pPr>
-            <a:lvl5pPr marL="1828800" indent="0">
-              <a:buNone/>
-              <a:defRPr sz="2000"/>
-            </a:lvl5pPr>
-            <a:lvl6pPr marL="2286000" indent="0">
-              <a:buNone/>
-              <a:defRPr sz="2000"/>
-            </a:lvl6pPr>
-            <a:lvl7pPr marL="2743200" indent="0">
-              <a:buNone/>
-              <a:defRPr sz="2000"/>
-            </a:lvl7pPr>
-            <a:lvl8pPr marL="3200400" indent="0">
-              <a:buNone/>
-              <a:defRPr sz="2000"/>
-            </a:lvl8pPr>
-            <a:lvl9pPr marL="3657600" indent="0">
-              <a:buNone/>
-              <a:defRPr sz="2000"/>
-            </a:lvl9pPr>
-          </a:lstStyle>
-          <a:p>
-            <a:r>
-              <a:rPr lang="es-ES" smtClean="0"/>
-              <a:t>Haga clic en el icono para agregar una imagen</a:t>
-            </a:r>
-            <a:endParaRPr lang="en-US" dirty="0"/>
-          </a:p>
-        </p:txBody>
-      </p:sp>
-      <p:sp>
-        <p:nvSpPr>
-          <p:cNvPr id="4" name="Text Placeholder 3"/>
-          <p:cNvSpPr>
-            <a:spLocks noGrp="1"/>
-          </p:cNvSpPr>
-          <p:nvPr>
-            <p:ph type="body" sz="half" idx="2"/>
-          </p:nvPr>
-        </p:nvSpPr>
-        <p:spPr>
-          <a:xfrm>
-            <a:off x="7162800" y="2133600"/>
-            <a:ext cx="1676400" cy="2971800"/>
-          </a:xfrm>
-        </p:spPr>
-        <p:txBody>
-          <a:bodyPr tIns="0"/>
-          <a:lstStyle>
-            <a:lvl1pPr marL="0" indent="0">
-              <a:buNone/>
-              <a:defRPr sz="1400">
-                <a:solidFill>
-                  <a:schemeClr val="tx1"/>
-                </a:solidFill>
-              </a:defRPr>
-            </a:lvl1pPr>
-            <a:lvl2pPr marL="457200" indent="0">
-              <a:buNone/>
-              <a:defRPr sz="1200"/>
-            </a:lvl2pPr>
-            <a:lvl3pPr marL="914400" indent="0">
-              <a:buNone/>
-              <a:defRPr sz="1000"/>
-            </a:lvl3pPr>
-            <a:lvl4pPr marL="1371600" indent="0">
-              <a:buNone/>
-              <a:defRPr sz="900"/>
-            </a:lvl4pPr>
-            <a:lvl5pPr marL="1828800" indent="0">
-              <a:buNone/>
-              <a:defRPr sz="900"/>
-            </a:lvl5pPr>
-            <a:lvl6pPr marL="2286000" indent="0">
-              <a:buNone/>
-              <a:defRPr sz="900"/>
-            </a:lvl6pPr>
-            <a:lvl7pPr marL="2743200" indent="0">
-              <a:buNone/>
-              <a:defRPr sz="900"/>
-            </a:lvl7pPr>
-            <a:lvl8pPr marL="3200400" indent="0">
-              <a:buNone/>
-              <a:defRPr sz="900"/>
-            </a:lvl8pPr>
-            <a:lvl9pPr marL="3657600" indent="0">
-              <a:buNone/>
-              <a:defRPr sz="900"/>
-            </a:lvl9pPr>
-          </a:lstStyle>
-          <a:p>
-            <a:pPr lvl="0"/>
-            <a:r>
-              <a:rPr lang="es-ES" smtClean="0"/>
-              <a:t>Haga clic para modificar el estilo de texto del patrón</a:t>
-            </a:r>
-          </a:p>
-        </p:txBody>
-      </p:sp>
-      <p:sp>
-        <p:nvSpPr>
-          <p:cNvPr id="5" name="Date Placeholder 4"/>
-          <p:cNvSpPr>
-            <a:spLocks noGrp="1"/>
-          </p:cNvSpPr>
-          <p:nvPr>
-            <p:ph type="dt" sz="half" idx="10"/>
-          </p:nvPr>
-        </p:nvSpPr>
-        <p:spPr/>
-        <p:txBody>
-          <a:bodyPr/>
-          <a:lstStyle/>
-          <a:p>
-            <a:fld id="{6E623EF4-7B94-4DE9-BEA9-6E505CCCEE3B}" type="datetimeFigureOut">
-              <a:rPr lang="es-CL" smtClean="0"/>
-              <a:t>05-09-2016</a:t>
-            </a:fld>
-            <a:endParaRPr lang="es-CL"/>
-          </a:p>
-        </p:txBody>
-      </p:sp>
-      <p:sp>
-        <p:nvSpPr>
-          <p:cNvPr id="6" name="Footer Placeholder 5"/>
-          <p:cNvSpPr>
-            <a:spLocks noGrp="1"/>
-          </p:cNvSpPr>
-          <p:nvPr>
-            <p:ph type="ftr" sz="quarter" idx="11"/>
-          </p:nvPr>
-        </p:nvSpPr>
-        <p:spPr/>
-        <p:txBody>
-          <a:bodyPr/>
-          <a:lstStyle/>
-          <a:p>
-            <a:endParaRPr lang="es-CL"/>
-          </a:p>
-        </p:txBody>
-      </p:sp>
-      <p:sp>
-        <p:nvSpPr>
-          <p:cNvPr id="7" name="Slide Number Placeholder 6"/>
-          <p:cNvSpPr>
-            <a:spLocks noGrp="1"/>
-          </p:cNvSpPr>
-          <p:nvPr>
-            <p:ph type="sldNum" sz="quarter" idx="12"/>
-          </p:nvPr>
-        </p:nvSpPr>
-        <p:spPr/>
-        <p:txBody>
-          <a:bodyPr/>
-          <a:lstStyle/>
-          <a:p>
-            <a:fld id="{B86FBE9E-6D20-44CB-A392-46B1E8398966}" type="slidenum">
-              <a:rPr lang="es-CL" smtClean="0"/>
-              <a:t>‹Nº›</a:t>
-            </a:fld>
-            <a:endParaRPr lang="es-CL"/>
-          </a:p>
-        </p:txBody>
-      </p:sp>
-      <p:sp>
-        <p:nvSpPr>
-          <p:cNvPr id="10" name="Title 9"/>
+          <p:cNvPr id="2" name="Title 1"/>
           <p:cNvSpPr>
             <a:spLocks noGrp="1"/>
           </p:cNvSpPr>
@@ -3130,15 +2296,18 @@
         </p:nvSpPr>
         <p:spPr>
           <a:xfrm>
-            <a:off x="7162800" y="460248"/>
-            <a:ext cx="1676400" cy="1673352"/>
+            <a:off x="301752" y="5495278"/>
+            <a:ext cx="7772400" cy="594626"/>
           </a:xfrm>
         </p:spPr>
         <p:txBody>
           <a:bodyPr anchor="b"/>
           <a:lstStyle>
-            <a:lvl1pPr algn="l">
-              <a:defRPr sz="2000" spc="150" baseline="0">
+            <a:lvl1pPr algn="ctr">
+              <a:defRPr sz="2200" b="1">
+                <a:ln>
+                  <a:noFill/>
+                </a:ln>
                 <a:solidFill>
                   <a:schemeClr val="tx2"/>
                 </a:solidFill>
@@ -3154,10 +2323,207 @@
           </a:p>
         </p:txBody>
       </p:sp>
+      <p:sp>
+        <p:nvSpPr>
+          <p:cNvPr id="3" name="Picture Placeholder 2"/>
+          <p:cNvSpPr>
+            <a:spLocks noGrp="1"/>
+          </p:cNvSpPr>
+          <p:nvPr>
+            <p:ph type="pic" idx="1"/>
+          </p:nvPr>
+        </p:nvSpPr>
+        <p:spPr>
+          <a:xfrm>
+            <a:off x="0" y="0"/>
+            <a:ext cx="8458200" cy="5486400"/>
+          </a:xfrm>
+        </p:spPr>
+        <p:txBody>
+          <a:bodyPr/>
+          <a:lstStyle>
+            <a:lvl1pPr marL="0" indent="0">
+              <a:buNone/>
+              <a:defRPr sz="3200"/>
+            </a:lvl1pPr>
+            <a:lvl2pPr marL="457200" indent="0">
+              <a:buNone/>
+              <a:defRPr sz="2800"/>
+            </a:lvl2pPr>
+            <a:lvl3pPr marL="914400" indent="0">
+              <a:buNone/>
+              <a:defRPr sz="2400"/>
+            </a:lvl3pPr>
+            <a:lvl4pPr marL="1371600" indent="0">
+              <a:buNone/>
+              <a:defRPr sz="2000"/>
+            </a:lvl4pPr>
+            <a:lvl5pPr marL="1828800" indent="0">
+              <a:buNone/>
+              <a:defRPr sz="2000"/>
+            </a:lvl5pPr>
+            <a:lvl6pPr marL="2286000" indent="0">
+              <a:buNone/>
+              <a:defRPr sz="2000"/>
+            </a:lvl6pPr>
+            <a:lvl7pPr marL="2743200" indent="0">
+              <a:buNone/>
+              <a:defRPr sz="2000"/>
+            </a:lvl7pPr>
+            <a:lvl8pPr marL="3200400" indent="0">
+              <a:buNone/>
+              <a:defRPr sz="2000"/>
+            </a:lvl8pPr>
+            <a:lvl9pPr marL="3657600" indent="0">
+              <a:buNone/>
+              <a:defRPr sz="2000"/>
+            </a:lvl9pPr>
+          </a:lstStyle>
+          <a:p>
+            <a:r>
+              <a:rPr lang="es-ES" smtClean="0"/>
+              <a:t>Haga clic en el icono para agregar una imagen</a:t>
+            </a:r>
+            <a:endParaRPr lang="en-US" dirty="0"/>
+          </a:p>
+        </p:txBody>
+      </p:sp>
+      <p:sp>
+        <p:nvSpPr>
+          <p:cNvPr id="4" name="Text Placeholder 3"/>
+          <p:cNvSpPr>
+            <a:spLocks noGrp="1"/>
+          </p:cNvSpPr>
+          <p:nvPr>
+            <p:ph type="body" sz="half" idx="2"/>
+          </p:nvPr>
+        </p:nvSpPr>
+        <p:spPr>
+          <a:xfrm>
+            <a:off x="301752" y="6096000"/>
+            <a:ext cx="7772400" cy="612648"/>
+          </a:xfrm>
+        </p:spPr>
+        <p:txBody>
+          <a:bodyPr>
+            <a:normAutofit/>
+          </a:bodyPr>
+          <a:lstStyle>
+            <a:lvl1pPr marL="0" indent="0" algn="ctr">
+              <a:buNone/>
+              <a:defRPr sz="1600"/>
+            </a:lvl1pPr>
+            <a:lvl2pPr marL="457200" indent="0">
+              <a:buNone/>
+              <a:defRPr sz="1200"/>
+            </a:lvl2pPr>
+            <a:lvl3pPr marL="914400" indent="0">
+              <a:buNone/>
+              <a:defRPr sz="1000"/>
+            </a:lvl3pPr>
+            <a:lvl4pPr marL="1371600" indent="0">
+              <a:buNone/>
+              <a:defRPr sz="900"/>
+            </a:lvl4pPr>
+            <a:lvl5pPr marL="1828800" indent="0">
+              <a:buNone/>
+              <a:defRPr sz="900"/>
+            </a:lvl5pPr>
+            <a:lvl6pPr marL="2286000" indent="0">
+              <a:buNone/>
+              <a:defRPr sz="900"/>
+            </a:lvl6pPr>
+            <a:lvl7pPr marL="2743200" indent="0">
+              <a:buNone/>
+              <a:defRPr sz="900"/>
+            </a:lvl7pPr>
+            <a:lvl8pPr marL="3200400" indent="0">
+              <a:buNone/>
+              <a:defRPr sz="900"/>
+            </a:lvl8pPr>
+            <a:lvl9pPr marL="3657600" indent="0">
+              <a:buNone/>
+              <a:defRPr sz="900"/>
+            </a:lvl9pPr>
+          </a:lstStyle>
+          <a:p>
+            <a:pPr lvl="0"/>
+            <a:r>
+              <a:rPr lang="es-ES" smtClean="0"/>
+              <a:t>Haga clic para modificar el estilo de texto del patrón</a:t>
+            </a:r>
+          </a:p>
+        </p:txBody>
+      </p:sp>
+      <p:sp>
+        <p:nvSpPr>
+          <p:cNvPr id="8" name="Date Placeholder 7"/>
+          <p:cNvSpPr>
+            <a:spLocks noGrp="1"/>
+          </p:cNvSpPr>
+          <p:nvPr>
+            <p:ph type="dt" sz="half" idx="10"/>
+          </p:nvPr>
+        </p:nvSpPr>
+        <p:spPr/>
+        <p:txBody>
+          <a:bodyPr/>
+          <a:lstStyle/>
+          <a:p>
+            <a:fld id="{6E623EF4-7B94-4DE9-BEA9-6E505CCCEE3B}" type="datetimeFigureOut">
+              <a:rPr lang="es-CL" smtClean="0"/>
+              <a:t>06-09-2016</a:t>
+            </a:fld>
+            <a:endParaRPr lang="es-CL"/>
+          </a:p>
+        </p:txBody>
+      </p:sp>
+      <p:sp>
+        <p:nvSpPr>
+          <p:cNvPr id="9" name="Slide Number Placeholder 8"/>
+          <p:cNvSpPr>
+            <a:spLocks noGrp="1"/>
+          </p:cNvSpPr>
+          <p:nvPr>
+            <p:ph type="sldNum" sz="quarter" idx="11"/>
+          </p:nvPr>
+        </p:nvSpPr>
+        <p:spPr/>
+        <p:txBody>
+          <a:bodyPr/>
+          <a:lstStyle/>
+          <a:p>
+            <a:fld id="{B86FBE9E-6D20-44CB-A392-46B1E8398966}" type="slidenum">
+              <a:rPr lang="es-CL" smtClean="0"/>
+              <a:t>‹Nº›</a:t>
+            </a:fld>
+            <a:endParaRPr lang="es-CL"/>
+          </a:p>
+        </p:txBody>
+      </p:sp>
+      <p:sp>
+        <p:nvSpPr>
+          <p:cNvPr id="10" name="Footer Placeholder 9"/>
+          <p:cNvSpPr>
+            <a:spLocks noGrp="1"/>
+          </p:cNvSpPr>
+          <p:nvPr>
+            <p:ph type="ftr" sz="quarter" idx="12"/>
+          </p:nvPr>
+        </p:nvSpPr>
+        <p:spPr/>
+        <p:txBody>
+          <a:bodyPr/>
+          <a:lstStyle/>
+          <a:p>
+            <a:endParaRPr lang="es-CL"/>
+          </a:p>
+        </p:txBody>
+      </p:sp>
     </p:spTree>
   </p:cSld>
   <p:clrMapOvr>
-    <a:overrideClrMapping bg1="dk1" tx1="lt1" bg2="dk2" tx2="lt2" accent1="accent1" accent2="accent2" accent3="accent3" accent4="accent4" accent5="accent5" accent6="accent6" hlink="hlink" folHlink="folHlink"/>
+    <a:masterClrMapping/>
   </p:clrMapOvr>
 </p:sldLayout>
 </file>
@@ -3166,7 +2532,7 @@
 <p:sldMaster xmlns:a="http://schemas.openxmlformats.org/drawingml/2006/main" xmlns:r="http://schemas.openxmlformats.org/officeDocument/2006/relationships" xmlns:p="http://schemas.openxmlformats.org/presentationml/2006/main">
   <p:cSld>
     <p:bg>
-      <p:bgRef idx="1001">
+      <p:bgRef idx="1002">
         <a:schemeClr val="bg1"/>
       </p:bgRef>
     </p:bg>
@@ -3186,20 +2552,115 @@
       </p:grpSpPr>
       <p:sp>
         <p:nvSpPr>
-          <p:cNvPr id="9" name="Rectangle 8"/>
+          <p:cNvPr id="2" name="Title Placeholder 1"/>
+          <p:cNvSpPr>
+            <a:spLocks noGrp="1"/>
+          </p:cNvSpPr>
+          <p:nvPr>
+            <p:ph type="title"/>
+          </p:nvPr>
+        </p:nvSpPr>
+        <p:spPr>
+          <a:xfrm>
+            <a:off x="457200" y="274638"/>
+            <a:ext cx="7620000" cy="1143000"/>
+          </a:xfrm>
+          <a:prstGeom prst="rect">
+            <a:avLst/>
+          </a:prstGeom>
+        </p:spPr>
+        <p:txBody>
+          <a:bodyPr vert="horz" lIns="91440" tIns="45720" rIns="91440" bIns="45720" rtlCol="0" anchor="ctr">
+            <a:noAutofit/>
+          </a:bodyPr>
+          <a:lstStyle/>
+          <a:p>
+            <a:r>
+              <a:rPr lang="es-ES" smtClean="0"/>
+              <a:t>Haga clic para modificar el estilo de título del patrón</a:t>
+            </a:r>
+            <a:endParaRPr lang="en-US" dirty="0"/>
+          </a:p>
+        </p:txBody>
+      </p:sp>
+      <p:sp>
+        <p:nvSpPr>
+          <p:cNvPr id="3" name="Text Placeholder 2"/>
+          <p:cNvSpPr>
+            <a:spLocks noGrp="1"/>
+          </p:cNvSpPr>
+          <p:nvPr>
+            <p:ph type="body" idx="1"/>
+          </p:nvPr>
+        </p:nvSpPr>
+        <p:spPr>
+          <a:xfrm>
+            <a:off x="457200" y="1600200"/>
+            <a:ext cx="7620000" cy="4800600"/>
+          </a:xfrm>
+          <a:prstGeom prst="rect">
+            <a:avLst/>
+          </a:prstGeom>
+        </p:spPr>
+        <p:txBody>
+          <a:bodyPr vert="horz" lIns="91440" tIns="45720" rIns="91440" bIns="45720" rtlCol="0">
+            <a:normAutofit/>
+          </a:bodyPr>
+          <a:lstStyle/>
+          <a:p>
+            <a:pPr lvl="0"/>
+            <a:r>
+              <a:rPr lang="es-ES" smtClean="0"/>
+              <a:t>Haga clic para modificar el estilo de texto del patrón</a:t>
+            </a:r>
+          </a:p>
+          <a:p>
+            <a:pPr lvl="1"/>
+            <a:r>
+              <a:rPr lang="es-ES" smtClean="0"/>
+              <a:t>Segundo nivel</a:t>
+            </a:r>
+          </a:p>
+          <a:p>
+            <a:pPr lvl="2"/>
+            <a:r>
+              <a:rPr lang="es-ES" smtClean="0"/>
+              <a:t>Tercer nivel</a:t>
+            </a:r>
+          </a:p>
+          <a:p>
+            <a:pPr lvl="3"/>
+            <a:r>
+              <a:rPr lang="es-ES" smtClean="0"/>
+              <a:t>Cuarto nivel</a:t>
+            </a:r>
+          </a:p>
+          <a:p>
+            <a:pPr lvl="4"/>
+            <a:r>
+              <a:rPr lang="es-ES" smtClean="0"/>
+              <a:t>Quinto nivel</a:t>
+            </a:r>
+            <a:endParaRPr lang="en-US" dirty="0"/>
+          </a:p>
+        </p:txBody>
+      </p:sp>
+      <p:sp>
+        <p:nvSpPr>
+          <p:cNvPr id="7" name="Rectangle 6"/>
           <p:cNvSpPr/>
           <p:nvPr/>
         </p:nvSpPr>
         <p:spPr>
           <a:xfrm>
-            <a:off x="152400" y="1634971"/>
-            <a:ext cx="8831802" cy="5045476"/>
+            <a:off x="8458200" y="0"/>
+            <a:ext cx="685800" cy="6858000"/>
           </a:xfrm>
           <a:prstGeom prst="rect">
             <a:avLst/>
           </a:prstGeom>
           <a:solidFill>
-            <a:schemeClr val="bg2"/>
+            <a:schemeClr val="tx2"/>
           </a:solidFill>
           <a:ln>
             <a:noFill/>
@@ -3238,14 +2699,14 @@
         </p:nvSpPr>
         <p:spPr>
           <a:xfrm>
-            <a:off x="152399" y="152400"/>
-            <a:ext cx="8814047" cy="1346447"/>
+            <a:off x="8458200" y="5486400"/>
+            <a:ext cx="685800" cy="685800"/>
           </a:xfrm>
           <a:prstGeom prst="rect">
             <a:avLst/>
           </a:prstGeom>
           <a:solidFill>
-            <a:schemeClr val="tx2"/>
+            <a:schemeClr val="accent1"/>
           </a:solidFill>
           <a:ln>
             <a:noFill/>
@@ -3278,202 +2739,37 @@
       </p:sp>
       <p:sp>
         <p:nvSpPr>
-          <p:cNvPr id="2" name="Title Placeholder 1"/>
-          <p:cNvSpPr>
-            <a:spLocks noGrp="1"/>
-          </p:cNvSpPr>
-          <p:nvPr>
-            <p:ph type="title"/>
-          </p:nvPr>
-        </p:nvSpPr>
-        <p:spPr>
-          <a:xfrm>
-            <a:off x="381000" y="355847"/>
-            <a:ext cx="8381260" cy="1054394"/>
-          </a:xfrm>
-          <a:prstGeom prst="rect">
-            <a:avLst/>
+          <p:cNvPr id="6" name="Slide Number Placeholder 5"/>
+          <p:cNvSpPr>
+            <a:spLocks noGrp="1"/>
+          </p:cNvSpPr>
+          <p:nvPr>
+            <p:ph type="sldNum" sz="quarter" idx="4"/>
+          </p:nvPr>
+        </p:nvSpPr>
+        <p:spPr>
+          <a:xfrm>
+            <a:off x="8531788" y="5648960"/>
+            <a:ext cx="548640" cy="396240"/>
+          </a:xfrm>
+          <a:prstGeom prst="bracketPair">
+            <a:avLst>
+              <a:gd name="adj" fmla="val 17949"/>
+            </a:avLst>
           </a:prstGeom>
-        </p:spPr>
-        <p:txBody>
-          <a:bodyPr vert="horz" lIns="91440" tIns="45720" rIns="91440" bIns="45720" rtlCol="0" anchor="ctr">
-            <a:noAutofit/>
-          </a:bodyPr>
-          <a:lstStyle/>
-          <a:p>
-            <a:r>
-              <a:rPr lang="es-ES" smtClean="0"/>
-              <a:t>Haga clic para modificar el estilo de título del patrón</a:t>
-            </a:r>
-            <a:endParaRPr lang="en-US" dirty="0"/>
-          </a:p>
-        </p:txBody>
-      </p:sp>
-      <p:sp>
-        <p:nvSpPr>
-          <p:cNvPr id="3" name="Text Placeholder 2"/>
-          <p:cNvSpPr>
-            <a:spLocks noGrp="1"/>
-          </p:cNvSpPr>
-          <p:nvPr>
-            <p:ph type="body" idx="1"/>
-          </p:nvPr>
-        </p:nvSpPr>
-        <p:spPr>
-          <a:xfrm>
-            <a:off x="380999" y="1719071"/>
-            <a:ext cx="8407893" cy="4407408"/>
-          </a:xfrm>
-          <a:prstGeom prst="rect">
-            <a:avLst/>
-          </a:prstGeom>
-        </p:spPr>
-        <p:txBody>
-          <a:bodyPr vert="horz" lIns="91440" tIns="45720" rIns="91440" bIns="45720" rtlCol="0">
-            <a:normAutofit/>
-          </a:bodyPr>
-          <a:lstStyle/>
-          <a:p>
-            <a:pPr lvl="0"/>
-            <a:r>
-              <a:rPr lang="es-ES" smtClean="0"/>
-              <a:t>Haga clic para modificar el estilo de texto del patrón</a:t>
-            </a:r>
-          </a:p>
-          <a:p>
-            <a:pPr lvl="1"/>
-            <a:r>
-              <a:rPr lang="es-ES" smtClean="0"/>
-              <a:t>Segundo nivel</a:t>
-            </a:r>
-          </a:p>
-          <a:p>
-            <a:pPr lvl="2"/>
-            <a:r>
-              <a:rPr lang="es-ES" smtClean="0"/>
-              <a:t>Tercer nivel</a:t>
-            </a:r>
-          </a:p>
-          <a:p>
-            <a:pPr lvl="3"/>
-            <a:r>
-              <a:rPr lang="es-ES" smtClean="0"/>
-              <a:t>Cuarto nivel</a:t>
-            </a:r>
-          </a:p>
-          <a:p>
-            <a:pPr lvl="4"/>
-            <a:r>
-              <a:rPr lang="es-ES" smtClean="0"/>
-              <a:t>Quinto nivel</a:t>
-            </a:r>
-            <a:endParaRPr lang="en-US" dirty="0"/>
-          </a:p>
-        </p:txBody>
-      </p:sp>
-      <p:sp>
-        <p:nvSpPr>
-          <p:cNvPr id="4" name="Date Placeholder 3"/>
-          <p:cNvSpPr>
-            <a:spLocks noGrp="1"/>
-          </p:cNvSpPr>
-          <p:nvPr>
-            <p:ph type="dt" sz="half" idx="2"/>
-          </p:nvPr>
-        </p:nvSpPr>
-        <p:spPr>
-          <a:xfrm>
-            <a:off x="370888" y="6356350"/>
-            <a:ext cx="2133600" cy="274320"/>
-          </a:xfrm>
-          <a:prstGeom prst="rect">
-            <a:avLst/>
-          </a:prstGeom>
-        </p:spPr>
-        <p:txBody>
-          <a:bodyPr vert="horz" lIns="91440" tIns="45720" rIns="91440" bIns="45720" rtlCol="0" anchor="ctr"/>
-          <a:lstStyle>
-            <a:lvl1pPr algn="l">
-              <a:defRPr sz="1100">
-                <a:solidFill>
-                  <a:schemeClr val="tx2"/>
-                </a:solidFill>
-              </a:defRPr>
-            </a:lvl1pPr>
-          </a:lstStyle>
-          <a:p>
-            <a:fld id="{6E623EF4-7B94-4DE9-BEA9-6E505CCCEE3B}" type="datetimeFigureOut">
-              <a:rPr lang="es-CL" smtClean="0"/>
-              <a:t>05-09-2016</a:t>
-            </a:fld>
-            <a:endParaRPr lang="es-CL"/>
-          </a:p>
-        </p:txBody>
-      </p:sp>
-      <p:sp>
-        <p:nvSpPr>
-          <p:cNvPr id="5" name="Footer Placeholder 4"/>
-          <p:cNvSpPr>
-            <a:spLocks noGrp="1"/>
-          </p:cNvSpPr>
-          <p:nvPr>
-            <p:ph type="ftr" sz="quarter" idx="3"/>
-          </p:nvPr>
-        </p:nvSpPr>
-        <p:spPr>
-          <a:xfrm>
-            <a:off x="3048000" y="6356350"/>
-            <a:ext cx="3352800" cy="274320"/>
-          </a:xfrm>
-          <a:prstGeom prst="rect">
-            <a:avLst/>
-          </a:prstGeom>
-        </p:spPr>
-        <p:txBody>
-          <a:bodyPr vert="horz" lIns="91440" tIns="45720" rIns="91440" bIns="45720" rtlCol="0" anchor="ctr"/>
+          <a:ln w="19050">
+            <a:solidFill>
+              <a:srgbClr val="FFFFFF"/>
+            </a:solidFill>
+          </a:ln>
+        </p:spPr>
+        <p:txBody>
+          <a:bodyPr vert="horz" lIns="0" tIns="0" rIns="0" bIns="0" rtlCol="0" anchor="ctr"/>
           <a:lstStyle>
             <a:lvl1pPr algn="ctr">
-              <a:defRPr sz="1100">
+              <a:defRPr sz="1800">
                 <a:solidFill>
-                  <a:schemeClr val="tx2"/>
-                </a:solidFill>
-              </a:defRPr>
-            </a:lvl1pPr>
-          </a:lstStyle>
-          <a:p>
-            <a:endParaRPr lang="es-CL"/>
-          </a:p>
-        </p:txBody>
-      </p:sp>
-      <p:sp>
-        <p:nvSpPr>
-          <p:cNvPr id="6" name="Slide Number Placeholder 5"/>
-          <p:cNvSpPr>
-            <a:spLocks noGrp="1"/>
-          </p:cNvSpPr>
-          <p:nvPr>
-            <p:ph type="sldNum" sz="quarter" idx="4"/>
-          </p:nvPr>
-        </p:nvSpPr>
-        <p:spPr>
-          <a:xfrm>
-            <a:off x="8234680" y="6355080"/>
-            <a:ext cx="582966" cy="274320"/>
-          </a:xfrm>
-          <a:prstGeom prst="rect">
-            <a:avLst/>
-          </a:prstGeom>
-          <a:ln w="19050">
-            <a:noFill/>
-          </a:ln>
-        </p:spPr>
-        <p:txBody>
-          <a:bodyPr vert="horz" lIns="91440" tIns="45720" rIns="91440" bIns="45720" rtlCol="0" anchor="ctr"/>
-          <a:lstStyle>
-            <a:lvl1pPr algn="ctr">
-              <a:defRPr sz="1100">
-                <a:solidFill>
-                  <a:schemeClr val="tx2"/>
+                  <a:srgbClr val="FFFFFF"/>
                 </a:solidFill>
               </a:defRPr>
             </a:lvl1pPr>
@@ -3487,35 +2783,109 @@
           </a:p>
         </p:txBody>
       </p:sp>
+      <p:sp>
+        <p:nvSpPr>
+          <p:cNvPr id="5" name="Footer Placeholder 4"/>
+          <p:cNvSpPr>
+            <a:spLocks noGrp="1"/>
+          </p:cNvSpPr>
+          <p:nvPr>
+            <p:ph type="ftr" sz="quarter" idx="3"/>
+          </p:nvPr>
+        </p:nvSpPr>
+        <p:spPr>
+          <a:xfrm rot="16200000">
+            <a:off x="7586910" y="4048760"/>
+            <a:ext cx="2367281" cy="365760"/>
+          </a:xfrm>
+          <a:prstGeom prst="rect">
+            <a:avLst/>
+          </a:prstGeom>
+        </p:spPr>
+        <p:txBody>
+          <a:bodyPr vert="horz" lIns="91440" tIns="45720" rIns="91440" bIns="45720" rtlCol="0" anchor="ctr"/>
+          <a:lstStyle>
+            <a:lvl1pPr algn="r">
+              <a:defRPr sz="1200">
+                <a:solidFill>
+                  <a:schemeClr val="bg2"/>
+                </a:solidFill>
+              </a:defRPr>
+            </a:lvl1pPr>
+          </a:lstStyle>
+          <a:p>
+            <a:endParaRPr lang="es-CL"/>
+          </a:p>
+        </p:txBody>
+      </p:sp>
+      <p:sp>
+        <p:nvSpPr>
+          <p:cNvPr id="4" name="Date Placeholder 3"/>
+          <p:cNvSpPr>
+            <a:spLocks noGrp="1"/>
+          </p:cNvSpPr>
+          <p:nvPr>
+            <p:ph type="dt" sz="half" idx="2"/>
+          </p:nvPr>
+        </p:nvSpPr>
+        <p:spPr>
+          <a:xfrm rot="16200000">
+            <a:off x="7551351" y="1645920"/>
+            <a:ext cx="2438399" cy="365760"/>
+          </a:xfrm>
+          <a:prstGeom prst="rect">
+            <a:avLst/>
+          </a:prstGeom>
+        </p:spPr>
+        <p:txBody>
+          <a:bodyPr vert="horz" lIns="91440" tIns="45720" rIns="91440" bIns="45720" rtlCol="0" anchor="ctr"/>
+          <a:lstStyle>
+            <a:lvl1pPr algn="l">
+              <a:defRPr sz="1200">
+                <a:solidFill>
+                  <a:schemeClr val="bg2"/>
+                </a:solidFill>
+              </a:defRPr>
+            </a:lvl1pPr>
+          </a:lstStyle>
+          <a:p>
+            <a:fld id="{6E623EF4-7B94-4DE9-BEA9-6E505CCCEE3B}" type="datetimeFigureOut">
+              <a:rPr lang="es-CL" smtClean="0"/>
+              <a:t>06-09-2016</a:t>
+            </a:fld>
+            <a:endParaRPr lang="es-CL"/>
+          </a:p>
+        </p:txBody>
+      </p:sp>
     </p:spTree>
   </p:cSld>
   <p:clrMap bg1="lt1" tx1="dk1" bg2="lt2" tx2="dk2" accent1="accent1" accent2="accent2" accent3="accent3" accent4="accent4" accent5="accent5" accent6="accent6" hlink="hlink" folHlink="folHlink"/>
   <p:sldLayoutIdLst>
-    <p:sldLayoutId id="2147483661" r:id="rId1"/>
-    <p:sldLayoutId id="2147483662" r:id="rId2"/>
-    <p:sldLayoutId id="2147483663" r:id="rId3"/>
-    <p:sldLayoutId id="2147483664" r:id="rId4"/>
-    <p:sldLayoutId id="2147483665" r:id="rId5"/>
-    <p:sldLayoutId id="2147483666" r:id="rId6"/>
-    <p:sldLayoutId id="2147483667" r:id="rId7"/>
-    <p:sldLayoutId id="2147483668" r:id="rId8"/>
-    <p:sldLayoutId id="2147483669" r:id="rId9"/>
-    <p:sldLayoutId id="2147483670" r:id="rId10"/>
-    <p:sldLayoutId id="2147483671" r:id="rId11"/>
+    <p:sldLayoutId id="2147483697" r:id="rId1"/>
+    <p:sldLayoutId id="2147483698" r:id="rId2"/>
+    <p:sldLayoutId id="2147483699" r:id="rId3"/>
+    <p:sldLayoutId id="2147483700" r:id="rId4"/>
+    <p:sldLayoutId id="2147483701" r:id="rId5"/>
+    <p:sldLayoutId id="2147483702" r:id="rId6"/>
+    <p:sldLayoutId id="2147483703" r:id="rId7"/>
+    <p:sldLayoutId id="2147483704" r:id="rId8"/>
+    <p:sldLayoutId id="2147483705" r:id="rId9"/>
+    <p:sldLayoutId id="2147483706" r:id="rId10"/>
+    <p:sldLayoutId id="2147483707" r:id="rId11"/>
   </p:sldLayoutIdLst>
   <p:txStyles>
     <p:titleStyle>
-      <a:lvl1pPr algn="ctr" defTabSz="914400" rtl="0" eaLnBrk="1" latinLnBrk="0" hangingPunct="1">
+      <a:lvl1pPr algn="l" defTabSz="914400" rtl="0" eaLnBrk="1" latinLnBrk="0" hangingPunct="1">
         <a:spcBef>
           <a:spcPct val="0"/>
         </a:spcBef>
         <a:buNone/>
-        <a:defRPr sz="3200" kern="1200" cap="all" spc="200" baseline="0">
+        <a:defRPr sz="4600" kern="1200" cap="none" spc="-100" baseline="0">
           <a:ln>
             <a:noFill/>
           </a:ln>
           <a:solidFill>
-            <a:schemeClr val="bg1"/>
+            <a:schemeClr val="tx2"/>
           </a:solidFill>
           <a:effectLst/>
           <a:latin typeface="+mj-lt"/>
@@ -3525,126 +2895,126 @@
       </a:lvl1pPr>
     </p:titleStyle>
     <p:bodyStyle>
-      <a:lvl1pPr marL="274320" indent="-228600" algn="l" defTabSz="914400" rtl="0" eaLnBrk="1" latinLnBrk="0" hangingPunct="1">
+      <a:lvl1pPr marL="342900" indent="-228600" algn="l" defTabSz="914400" rtl="0" eaLnBrk="1" latinLnBrk="0" hangingPunct="1">
         <a:spcBef>
           <a:spcPct val="20000"/>
         </a:spcBef>
         <a:buClr>
           <a:schemeClr val="accent1"/>
         </a:buClr>
-        <a:buFont typeface="Wingdings 2" pitchFamily="18" charset="2"/>
-        <a:buChar char=""/>
-        <a:defRPr sz="2000" kern="1200" spc="150" baseline="0">
+        <a:buFont typeface="Arial" pitchFamily="34" charset="0"/>
+        <a:buChar char="•"/>
+        <a:defRPr sz="2200" kern="1200">
           <a:solidFill>
-            <a:schemeClr val="tx2"/>
+            <a:schemeClr val="tx1"/>
           </a:solidFill>
           <a:latin typeface="+mn-lt"/>
           <a:ea typeface="+mn-ea"/>
           <a:cs typeface="+mn-cs"/>
         </a:defRPr>
       </a:lvl1pPr>
-      <a:lvl2pPr marL="548640" indent="-182880" algn="l" defTabSz="914400" rtl="0" eaLnBrk="1" latinLnBrk="0" hangingPunct="1">
+      <a:lvl2pPr marL="640080" indent="-228600" algn="l" defTabSz="914400" rtl="0" eaLnBrk="1" latinLnBrk="0" hangingPunct="1">
         <a:spcBef>
           <a:spcPct val="20000"/>
         </a:spcBef>
         <a:buClr>
           <a:schemeClr val="accent2"/>
         </a:buClr>
-        <a:buFont typeface="Wingdings" pitchFamily="2" charset="2"/>
-        <a:buChar char="§"/>
-        <a:defRPr sz="1800" kern="1200" spc="100" baseline="0">
+        <a:buFont typeface="Arial" pitchFamily="34" charset="0"/>
+        <a:buChar char="•"/>
+        <a:defRPr sz="2000" kern="1200">
           <a:solidFill>
-            <a:schemeClr val="tx2"/>
+            <a:schemeClr val="tx1"/>
           </a:solidFill>
           <a:latin typeface="+mn-lt"/>
           <a:ea typeface="+mn-ea"/>
           <a:cs typeface="+mn-cs"/>
         </a:defRPr>
       </a:lvl2pPr>
-      <a:lvl3pPr marL="822960" indent="-182880" algn="l" defTabSz="914400" rtl="0" eaLnBrk="1" latinLnBrk="0" hangingPunct="1">
+      <a:lvl3pPr marL="1005840" indent="-228600" algn="l" defTabSz="914400" rtl="0" eaLnBrk="1" latinLnBrk="0" hangingPunct="1">
         <a:spcBef>
           <a:spcPct val="20000"/>
         </a:spcBef>
         <a:buClr>
           <a:schemeClr val="accent3"/>
         </a:buClr>
-        <a:buFont typeface="Wingdings" pitchFamily="2" charset="2"/>
-        <a:buChar char="§"/>
-        <a:defRPr sz="1600" kern="1200" spc="100" baseline="0">
+        <a:buFont typeface="Arial" pitchFamily="34" charset="0"/>
+        <a:buChar char="•"/>
+        <a:defRPr sz="1800" kern="1200">
           <a:solidFill>
-            <a:schemeClr val="tx2"/>
+            <a:schemeClr val="tx1"/>
           </a:solidFill>
           <a:latin typeface="+mn-lt"/>
           <a:ea typeface="+mn-ea"/>
           <a:cs typeface="+mn-cs"/>
         </a:defRPr>
       </a:lvl3pPr>
-      <a:lvl4pPr marL="1097280" indent="-182880" algn="l" defTabSz="914400" rtl="0" eaLnBrk="1" latinLnBrk="0" hangingPunct="1">
+      <a:lvl4pPr marL="1280160" indent="-228600" algn="l" defTabSz="914400" rtl="0" eaLnBrk="1" latinLnBrk="0" hangingPunct="1">
         <a:spcBef>
           <a:spcPct val="20000"/>
         </a:spcBef>
         <a:buClr>
           <a:schemeClr val="accent4"/>
         </a:buClr>
-        <a:buFont typeface="Wingdings" pitchFamily="2" charset="2"/>
-        <a:buChar char="§"/>
-        <a:defRPr sz="1400" kern="1200">
+        <a:buFont typeface="Arial" pitchFamily="34" charset="0"/>
+        <a:buChar char="•"/>
+        <a:defRPr sz="1600" kern="1200">
           <a:solidFill>
-            <a:schemeClr val="tx2"/>
+            <a:schemeClr val="tx1"/>
           </a:solidFill>
           <a:latin typeface="+mn-lt"/>
           <a:ea typeface="+mn-ea"/>
           <a:cs typeface="+mn-cs"/>
         </a:defRPr>
       </a:lvl4pPr>
-      <a:lvl5pPr marL="1280160" indent="-182880" algn="l" defTabSz="914400" rtl="0" eaLnBrk="1" latinLnBrk="0" hangingPunct="1">
+      <a:lvl5pPr marL="1554480" indent="-228600" algn="l" defTabSz="914400" rtl="0" eaLnBrk="1" latinLnBrk="0" hangingPunct="1">
         <a:spcBef>
           <a:spcPct val="20000"/>
         </a:spcBef>
         <a:buClr>
-          <a:schemeClr val="accent6"/>
+          <a:schemeClr val="accent5"/>
         </a:buClr>
-        <a:buFont typeface="Wingdings" pitchFamily="2" charset="2"/>
-        <a:buChar char="§"/>
-        <a:defRPr sz="1300" kern="1200" spc="100" baseline="0">
+        <a:buFont typeface="Arial" pitchFamily="34" charset="0"/>
+        <a:buChar char="•"/>
+        <a:defRPr sz="1400" kern="1200" baseline="0">
           <a:solidFill>
-            <a:schemeClr val="tx2"/>
+            <a:schemeClr val="tx1"/>
           </a:solidFill>
           <a:latin typeface="+mn-lt"/>
           <a:ea typeface="+mn-ea"/>
           <a:cs typeface="+mn-cs"/>
         </a:defRPr>
       </a:lvl5pPr>
-      <a:lvl6pPr marL="1554480" indent="-182880" algn="l" defTabSz="914400" rtl="0" eaLnBrk="1" latinLnBrk="0" hangingPunct="1">
+      <a:lvl6pPr marL="1737360" indent="-182880" algn="l" defTabSz="914400" rtl="0" eaLnBrk="1" latinLnBrk="0" hangingPunct="1">
         <a:spcBef>
           <a:spcPct val="20000"/>
         </a:spcBef>
         <a:buClr>
           <a:schemeClr val="accent1"/>
         </a:buClr>
-        <a:buFont typeface="Wingdings" pitchFamily="2" charset="2"/>
-        <a:buChar char="§"/>
-        <a:defRPr sz="1200" kern="1200">
+        <a:buFont typeface="Arial" pitchFamily="34" charset="0"/>
+        <a:buChar char="•"/>
+        <a:defRPr sz="1400" kern="1200" baseline="0">
           <a:solidFill>
-            <a:schemeClr val="tx2"/>
+            <a:schemeClr val="tx1"/>
           </a:solidFill>
           <a:latin typeface="+mn-lt"/>
           <a:ea typeface="+mn-ea"/>
           <a:cs typeface="+mn-cs"/>
         </a:defRPr>
       </a:lvl6pPr>
-      <a:lvl7pPr marL="1828800" indent="-182880" algn="l" defTabSz="914400" rtl="0" eaLnBrk="1" latinLnBrk="0" hangingPunct="1">
+      <a:lvl7pPr marL="1920240" indent="-182880" algn="l" defTabSz="914400" rtl="0" eaLnBrk="1" latinLnBrk="0" hangingPunct="1">
         <a:spcBef>
           <a:spcPct val="20000"/>
         </a:spcBef>
         <a:buClr>
           <a:schemeClr val="accent2"/>
         </a:buClr>
-        <a:buFont typeface="Wingdings" pitchFamily="2" charset="2"/>
-        <a:buChar char="§"/>
-        <a:defRPr sz="1200" kern="1200">
+        <a:buFont typeface="Arial" pitchFamily="34" charset="0"/>
+        <a:buChar char="•"/>
+        <a:defRPr sz="1400" kern="1200">
           <a:solidFill>
-            <a:schemeClr val="tx2"/>
+            <a:schemeClr val="tx1"/>
           </a:solidFill>
           <a:latin typeface="+mn-lt"/>
           <a:ea typeface="+mn-ea"/>
@@ -3658,29 +3028,29 @@
         <a:buClr>
           <a:schemeClr val="accent3"/>
         </a:buClr>
-        <a:buFont typeface="Wingdings" pitchFamily="2" charset="2"/>
-        <a:buChar char="§"/>
-        <a:defRPr sz="1200" kern="1200">
+        <a:buFont typeface="Arial" pitchFamily="34" charset="0"/>
+        <a:buChar char="•"/>
+        <a:defRPr sz="1400" kern="1200">
           <a:solidFill>
-            <a:schemeClr val="tx2"/>
+            <a:schemeClr val="tx1"/>
           </a:solidFill>
           <a:latin typeface="+mn-lt"/>
           <a:ea typeface="+mn-ea"/>
           <a:cs typeface="+mn-cs"/>
         </a:defRPr>
       </a:lvl8pPr>
-      <a:lvl9pPr marL="2377440" indent="-182880" algn="l" defTabSz="914400" rtl="0" eaLnBrk="1" latinLnBrk="0" hangingPunct="1">
+      <a:lvl9pPr marL="2286000" indent="-182880" algn="l" defTabSz="914400" rtl="0" eaLnBrk="1" latinLnBrk="0" hangingPunct="1">
         <a:spcBef>
           <a:spcPct val="20000"/>
         </a:spcBef>
         <a:buClr>
-          <a:schemeClr val="accent5"/>
+          <a:schemeClr val="accent4"/>
         </a:buClr>
-        <a:buFont typeface="Wingdings" pitchFamily="2" charset="2"/>
-        <a:buChar char="§"/>
-        <a:defRPr sz="1200" kern="1200">
+        <a:buFont typeface="Arial" pitchFamily="34" charset="0"/>
+        <a:buChar char="•"/>
+        <a:defRPr sz="1400" kern="1200">
           <a:solidFill>
-            <a:schemeClr val="tx2"/>
+            <a:schemeClr val="tx1"/>
           </a:solidFill>
           <a:latin typeface="+mn-lt"/>
           <a:ea typeface="+mn-ea"/>
@@ -3806,42 +3176,187 @@
       </p:grpSpPr>
       <p:sp>
         <p:nvSpPr>
-          <p:cNvPr id="3" name="2 Subtítulo"/>
-          <p:cNvSpPr>
-            <a:spLocks noGrp="1"/>
-          </p:cNvSpPr>
-          <p:nvPr>
-            <p:ph type="subTitle" idx="1"/>
-          </p:nvPr>
-        </p:nvSpPr>
-        <p:spPr/>
+          <p:cNvPr id="2" name="1 Título"/>
+          <p:cNvSpPr>
+            <a:spLocks noGrp="1"/>
+          </p:cNvSpPr>
+          <p:nvPr>
+            <p:ph type="ctrTitle"/>
+          </p:nvPr>
+        </p:nvSpPr>
+        <p:spPr>
+          <a:xfrm>
+            <a:off x="827584" y="2852936"/>
+            <a:ext cx="6324600" cy="1828800"/>
+          </a:xfrm>
+        </p:spPr>
         <p:txBody>
           <a:bodyPr/>
           <a:lstStyle/>
           <a:p>
-            <a:endParaRPr lang="es-CL"/>
-          </a:p>
-        </p:txBody>
-      </p:sp>
-      <p:sp>
-        <p:nvSpPr>
-          <p:cNvPr id="2" name="1 Título"/>
-          <p:cNvSpPr>
-            <a:spLocks noGrp="1"/>
-          </p:cNvSpPr>
-          <p:nvPr>
-            <p:ph type="title"/>
-          </p:nvPr>
-        </p:nvSpPr>
-        <p:spPr/>
-        <p:txBody>
-          <a:bodyPr/>
-          <a:lstStyle/>
-          <a:p>
+            <a:r>
+              <a:rPr lang="es-CL" dirty="0" smtClean="0"/>
+              <a:t>Sada (sistema adaptativo de aprendizaje)</a:t>
+            </a:r>
             <a:endParaRPr lang="es-CL" dirty="0"/>
           </a:p>
         </p:txBody>
       </p:sp>
+      <p:sp>
+        <p:nvSpPr>
+          <p:cNvPr id="3" name="2 CuadroTexto"/>
+          <p:cNvSpPr txBox="1"/>
+          <p:nvPr/>
+        </p:nvSpPr>
+        <p:spPr>
+          <a:xfrm>
+            <a:off x="4788024" y="5229200"/>
+            <a:ext cx="2664296" cy="923330"/>
+          </a:xfrm>
+          <a:prstGeom prst="rect">
+            <a:avLst/>
+          </a:prstGeom>
+          <a:noFill/>
+        </p:spPr>
+        <p:txBody>
+          <a:bodyPr wrap="square" rtlCol="0">
+            <a:spAutoFit/>
+          </a:bodyPr>
+          <a:lstStyle/>
+          <a:p>
+            <a:r>
+              <a:rPr lang="es-CL" dirty="0" smtClean="0"/>
+              <a:t>Nicolás Alarcón</a:t>
+            </a:r>
+          </a:p>
+          <a:p>
+            <a:r>
+              <a:rPr lang="es-CL" dirty="0" smtClean="0"/>
+              <a:t>Rodrigo </a:t>
+            </a:r>
+            <a:r>
+              <a:rPr lang="es-CL" dirty="0" err="1" smtClean="0"/>
+              <a:t>Elicer</a:t>
+            </a:r>
+            <a:endParaRPr lang="es-CL" dirty="0" smtClean="0"/>
+          </a:p>
+          <a:p>
+            <a:r>
+              <a:rPr lang="es-CL" dirty="0" smtClean="0"/>
+              <a:t>Gabriel Valenzuela</a:t>
+            </a:r>
+            <a:endParaRPr lang="es-CL" dirty="0"/>
+          </a:p>
+        </p:txBody>
+      </p:sp>
+      <p:pic>
+        <p:nvPicPr>
+          <p:cNvPr id="1027" name="Picture 3" descr="C:\Users\Gabriel ^^\Desktop\USM\6to_semestre\Infosoc\Tarea1\Images\250px-Utfsm.svg.png"/>
+          <p:cNvPicPr>
+            <a:picLocks noChangeAspect="1" noChangeArrowheads="1"/>
+          </p:cNvPicPr>
+          <p:nvPr/>
+        </p:nvPicPr>
+        <p:blipFill>
+          <a:blip r:embed="rId2">
+            <a:extLst>
+              <a:ext uri="{28A0092B-C50C-407E-A947-70E740481C1C}">
+                <a14:useLocalDpi xmlns:a14="http://schemas.microsoft.com/office/drawing/2010/main" val="0"/>
+              </a:ext>
+            </a:extLst>
+          </a:blip>
+          <a:srcRect/>
+          <a:stretch>
+            <a:fillRect/>
+          </a:stretch>
+        </p:blipFill>
+        <p:spPr bwMode="auto">
+          <a:xfrm>
+            <a:off x="179512" y="152385"/>
+            <a:ext cx="2381250" cy="1152525"/>
+          </a:xfrm>
+          <a:prstGeom prst="rect">
+            <a:avLst/>
+          </a:prstGeom>
+          <a:noFill/>
+          <a:extLst>
+            <a:ext uri="{909E8E84-426E-40DD-AFC4-6F175D3DCCD1}">
+              <a14:hiddenFill xmlns:a14="http://schemas.microsoft.com/office/drawing/2010/main">
+                <a:solidFill>
+                  <a:srgbClr val="FFFFFF"/>
+                </a:solidFill>
+              </a14:hiddenFill>
+            </a:ext>
+          </a:extLst>
+        </p:spPr>
+      </p:pic>
+      <p:pic>
+        <p:nvPicPr>
+          <p:cNvPr id="1026" name="Picture 2" descr="C:\Users\Gabriel ^^\Desktop\USM\6to_semestre\Software\ss+(2016-09-06+at+12.08.03).png"/>
+          <p:cNvPicPr>
+            <a:picLocks noChangeAspect="1" noChangeArrowheads="1"/>
+          </p:cNvPicPr>
+          <p:nvPr/>
+        </p:nvPicPr>
+        <p:blipFill>
+          <a:blip r:embed="rId3">
+            <a:extLst>
+              <a:ext uri="{BEBA8EAE-BF5A-486C-A8C5-ECC9F3942E4B}">
+                <a14:imgProps xmlns:a14="http://schemas.microsoft.com/office/drawing/2010/main">
+                  <a14:imgLayer r:embed="rId4">
+                    <a14:imgEffect>
+                      <a14:backgroundRemoval t="3306" b="94215" l="660" r="98680">
+                        <a14:foregroundMark x1="13201" y1="22314" x2="13201" y2="22314"/>
+                        <a14:foregroundMark x1="19142" y1="19835" x2="19142" y2="19835"/>
+                        <a14:foregroundMark x1="2970" y1="36364" x2="2970" y2="36364"/>
+                        <a14:foregroundMark x1="5611" y1="61157" x2="5611" y2="61157"/>
+                        <a14:foregroundMark x1="12871" y1="67769" x2="12871" y2="67769"/>
+                        <a14:foregroundMark x1="24092" y1="71074" x2="24092" y2="71074"/>
+                        <a14:foregroundMark x1="31023" y1="71901" x2="31023" y2="71901"/>
+                        <a14:foregroundMark x1="36634" y1="70248" x2="36634" y2="70248"/>
+                        <a14:foregroundMark x1="41254" y1="72727" x2="41254" y2="72727"/>
+                        <a14:foregroundMark x1="48845" y1="68595" x2="48845" y2="68595"/>
+                        <a14:foregroundMark x1="59736" y1="68595" x2="59736" y2="68595"/>
+                        <a14:foregroundMark x1="65677" y1="70248" x2="65677" y2="70248"/>
+                        <a14:foregroundMark x1="70297" y1="63636" x2="70297" y2="63636"/>
+                        <a14:foregroundMark x1="80198" y1="68595" x2="80198" y2="68595"/>
+                        <a14:foregroundMark x1="86139" y1="72727" x2="86139" y2="72727"/>
+                        <a14:foregroundMark x1="94389" y1="68595" x2="94389" y2="68595"/>
+                      </a14:backgroundRemoval>
+                    </a14:imgEffect>
+                  </a14:imgLayer>
+                </a14:imgProps>
+              </a:ext>
+              <a:ext uri="{28A0092B-C50C-407E-A947-70E740481C1C}">
+                <a14:useLocalDpi xmlns:a14="http://schemas.microsoft.com/office/drawing/2010/main" val="0"/>
+              </a:ext>
+            </a:extLst>
+          </a:blip>
+          <a:srcRect/>
+          <a:stretch>
+            <a:fillRect/>
+          </a:stretch>
+        </p:blipFill>
+        <p:spPr bwMode="auto">
+          <a:xfrm>
+            <a:off x="5292080" y="152384"/>
+            <a:ext cx="2886074" cy="1152525"/>
+          </a:xfrm>
+          <a:prstGeom prst="rect">
+            <a:avLst/>
+          </a:prstGeom>
+          <a:noFill/>
+          <a:extLst>
+            <a:ext uri="{909E8E84-426E-40DD-AFC4-6F175D3DCCD1}">
+              <a14:hiddenFill xmlns:a14="http://schemas.microsoft.com/office/drawing/2010/main">
+                <a:solidFill>
+                  <a:srgbClr val="FFFFFF"/>
+                </a:solidFill>
+              </a14:hiddenFill>
+            </a:ext>
+          </a:extLst>
+        </p:spPr>
+      </p:pic>
     </p:spTree>
     <p:extLst>
       <p:ext uri="{BB962C8B-B14F-4D97-AF65-F5344CB8AC3E}">
@@ -3852,6 +3367,13 @@
   <p:clrMapOvr>
     <a:masterClrMapping/>
   </p:clrMapOvr>
+  <p:timing>
+    <p:tnLst>
+      <p:par>
+        <p:cTn id="1" dur="indefinite" restart="never" nodeType="tmRoot"/>
+      </p:par>
+    </p:tnLst>
+  </p:timing>
 </p:sld>
 </file>
 
@@ -3874,6 +3396,29 @@
       </p:grpSpPr>
       <p:sp>
         <p:nvSpPr>
+          <p:cNvPr id="3" name="2 Título"/>
+          <p:cNvSpPr>
+            <a:spLocks noGrp="1"/>
+          </p:cNvSpPr>
+          <p:nvPr>
+            <p:ph type="title"/>
+          </p:nvPr>
+        </p:nvSpPr>
+        <p:spPr/>
+        <p:txBody>
+          <a:bodyPr/>
+          <a:lstStyle/>
+          <a:p>
+            <a:r>
+              <a:rPr lang="es-CL" dirty="0" smtClean="0"/>
+              <a:t>Requerimientos</a:t>
+            </a:r>
+            <a:endParaRPr lang="es-CL" dirty="0"/>
+          </a:p>
+        </p:txBody>
+      </p:sp>
+      <p:sp>
+        <p:nvSpPr>
           <p:cNvPr id="2" name="1 Marcador de contenido"/>
           <p:cNvSpPr>
             <a:spLocks noGrp="1"/>
@@ -3884,7 +3429,9 @@
         </p:nvSpPr>
         <p:spPr/>
         <p:txBody>
-          <a:bodyPr/>
+          <a:bodyPr>
+            <a:normAutofit/>
+          </a:bodyPr>
           <a:lstStyle/>
           <a:p>
             <a:r>
@@ -3986,29 +3533,6 @@
             <a:endParaRPr lang="es-CL" dirty="0" smtClean="0"/>
           </a:p>
           <a:p>
-            <a:endParaRPr lang="es-CL" dirty="0"/>
-          </a:p>
-        </p:txBody>
-      </p:sp>
-      <p:sp>
-        <p:nvSpPr>
-          <p:cNvPr id="3" name="2 Título"/>
-          <p:cNvSpPr>
-            <a:spLocks noGrp="1"/>
-          </p:cNvSpPr>
-          <p:nvPr>
-            <p:ph type="title"/>
-          </p:nvPr>
-        </p:nvSpPr>
-        <p:spPr/>
-        <p:txBody>
-          <a:bodyPr/>
-          <a:lstStyle/>
-          <a:p>
-            <a:r>
-              <a:rPr lang="es-CL" dirty="0" smtClean="0"/>
-              <a:t>Requerimientos</a:t>
-            </a:r>
             <a:endParaRPr lang="es-CL" dirty="0"/>
           </a:p>
         </p:txBody>
@@ -4065,29 +3589,1300 @@
           <a:bodyPr/>
           <a:lstStyle/>
           <a:p>
+            <a:r>
+              <a:rPr lang="es-CL" dirty="0" smtClean="0"/>
+              <a:t>Esquema</a:t>
+            </a:r>
+            <a:endParaRPr lang="es-CL" dirty="0"/>
+          </a:p>
+        </p:txBody>
+      </p:sp>
+      <p:sp>
+        <p:nvSpPr>
+          <p:cNvPr id="2" name="1 Cara sonriente"/>
+          <p:cNvSpPr/>
+          <p:nvPr/>
+        </p:nvSpPr>
+        <p:spPr>
+          <a:xfrm>
+            <a:off x="545930" y="1787469"/>
+            <a:ext cx="504056" cy="504056"/>
+          </a:xfrm>
+          <a:prstGeom prst="smileyFace">
+            <a:avLst/>
+          </a:prstGeom>
+        </p:spPr>
+        <p:style>
+          <a:lnRef idx="2">
+            <a:schemeClr val="accent6"/>
+          </a:lnRef>
+          <a:fillRef idx="1">
+            <a:schemeClr val="lt1"/>
+          </a:fillRef>
+          <a:effectRef idx="0">
+            <a:schemeClr val="accent6"/>
+          </a:effectRef>
+          <a:fontRef idx="minor">
+            <a:schemeClr val="dk1"/>
+          </a:fontRef>
+        </p:style>
+        <p:txBody>
+          <a:bodyPr rtlCol="0" anchor="ctr"/>
+          <a:lstStyle/>
+          <a:p>
+            <a:pPr algn="ctr"/>
             <a:endParaRPr lang="es-CL"/>
           </a:p>
         </p:txBody>
       </p:sp>
-      <p:sp>
-        <p:nvSpPr>
-          <p:cNvPr id="5" name="4 Marcador de contenido"/>
-          <p:cNvSpPr>
-            <a:spLocks noGrp="1"/>
-          </p:cNvSpPr>
-          <p:nvPr>
-            <p:ph idx="1"/>
-          </p:nvPr>
-        </p:nvSpPr>
-        <p:spPr/>
-        <p:txBody>
-          <a:bodyPr/>
-          <a:lstStyle/>
-          <a:p>
-            <a:endParaRPr lang="es-CL" dirty="0"/>
-          </a:p>
-        </p:txBody>
-      </p:sp>
+      <p:cxnSp>
+        <p:nvCxnSpPr>
+          <p:cNvPr id="8" name="7 Conector recto"/>
+          <p:cNvCxnSpPr>
+            <a:stCxn id="2" idx="4"/>
+          </p:cNvCxnSpPr>
+          <p:nvPr/>
+        </p:nvCxnSpPr>
+        <p:spPr>
+          <a:xfrm>
+            <a:off x="797958" y="2291525"/>
+            <a:ext cx="0" cy="720080"/>
+          </a:xfrm>
+          <a:prstGeom prst="line">
+            <a:avLst/>
+          </a:prstGeom>
+          <a:ln w="19050"/>
+        </p:spPr>
+        <p:style>
+          <a:lnRef idx="1">
+            <a:schemeClr val="accent6"/>
+          </a:lnRef>
+          <a:fillRef idx="0">
+            <a:schemeClr val="accent6"/>
+          </a:fillRef>
+          <a:effectRef idx="0">
+            <a:schemeClr val="accent6"/>
+          </a:effectRef>
+          <a:fontRef idx="minor">
+            <a:schemeClr val="tx1"/>
+          </a:fontRef>
+        </p:style>
+      </p:cxnSp>
+      <p:cxnSp>
+        <p:nvCxnSpPr>
+          <p:cNvPr id="10" name="9 Conector recto"/>
+          <p:cNvCxnSpPr/>
+          <p:nvPr/>
+        </p:nvCxnSpPr>
+        <p:spPr>
+          <a:xfrm>
+            <a:off x="545930" y="2579557"/>
+            <a:ext cx="576064" cy="0"/>
+          </a:xfrm>
+          <a:prstGeom prst="line">
+            <a:avLst/>
+          </a:prstGeom>
+          <a:ln w="19050"/>
+        </p:spPr>
+        <p:style>
+          <a:lnRef idx="1">
+            <a:schemeClr val="dk1"/>
+          </a:lnRef>
+          <a:fillRef idx="0">
+            <a:schemeClr val="dk1"/>
+          </a:fillRef>
+          <a:effectRef idx="0">
+            <a:schemeClr val="dk1"/>
+          </a:effectRef>
+          <a:fontRef idx="minor">
+            <a:schemeClr val="tx1"/>
+          </a:fontRef>
+        </p:style>
+      </p:cxnSp>
+      <p:cxnSp>
+        <p:nvCxnSpPr>
+          <p:cNvPr id="12" name="11 Conector recto"/>
+          <p:cNvCxnSpPr/>
+          <p:nvPr/>
+        </p:nvCxnSpPr>
+        <p:spPr>
+          <a:xfrm>
+            <a:off x="797958" y="2985640"/>
+            <a:ext cx="252028" cy="360040"/>
+          </a:xfrm>
+          <a:prstGeom prst="line">
+            <a:avLst/>
+          </a:prstGeom>
+          <a:ln w="19050"/>
+        </p:spPr>
+        <p:style>
+          <a:lnRef idx="1">
+            <a:schemeClr val="dk1"/>
+          </a:lnRef>
+          <a:fillRef idx="0">
+            <a:schemeClr val="dk1"/>
+          </a:fillRef>
+          <a:effectRef idx="0">
+            <a:schemeClr val="dk1"/>
+          </a:effectRef>
+          <a:fontRef idx="minor">
+            <a:schemeClr val="tx1"/>
+          </a:fontRef>
+        </p:style>
+      </p:cxnSp>
+      <p:cxnSp>
+        <p:nvCxnSpPr>
+          <p:cNvPr id="14" name="13 Conector recto"/>
+          <p:cNvCxnSpPr/>
+          <p:nvPr/>
+        </p:nvCxnSpPr>
+        <p:spPr>
+          <a:xfrm flipH="1">
+            <a:off x="545930" y="2985640"/>
+            <a:ext cx="252028" cy="360040"/>
+          </a:xfrm>
+          <a:prstGeom prst="line">
+            <a:avLst/>
+          </a:prstGeom>
+          <a:ln w="19050"/>
+        </p:spPr>
+        <p:style>
+          <a:lnRef idx="1">
+            <a:schemeClr val="dk1"/>
+          </a:lnRef>
+          <a:fillRef idx="0">
+            <a:schemeClr val="dk1"/>
+          </a:fillRef>
+          <a:effectRef idx="0">
+            <a:schemeClr val="dk1"/>
+          </a:effectRef>
+          <a:fontRef idx="minor">
+            <a:schemeClr val="tx1"/>
+          </a:fontRef>
+        </p:style>
+      </p:cxnSp>
+      <p:sp>
+        <p:nvSpPr>
+          <p:cNvPr id="16" name="15 Cara sonriente"/>
+          <p:cNvSpPr/>
+          <p:nvPr/>
+        </p:nvSpPr>
+        <p:spPr>
+          <a:xfrm>
+            <a:off x="575556" y="4564811"/>
+            <a:ext cx="504056" cy="504056"/>
+          </a:xfrm>
+          <a:prstGeom prst="smileyFace">
+            <a:avLst/>
+          </a:prstGeom>
+        </p:spPr>
+        <p:style>
+          <a:lnRef idx="2">
+            <a:schemeClr val="accent6"/>
+          </a:lnRef>
+          <a:fillRef idx="1">
+            <a:schemeClr val="lt1"/>
+          </a:fillRef>
+          <a:effectRef idx="0">
+            <a:schemeClr val="accent6"/>
+          </a:effectRef>
+          <a:fontRef idx="minor">
+            <a:schemeClr val="dk1"/>
+          </a:fontRef>
+        </p:style>
+        <p:txBody>
+          <a:bodyPr rtlCol="0" anchor="ctr"/>
+          <a:lstStyle/>
+          <a:p>
+            <a:pPr algn="ctr"/>
+            <a:endParaRPr lang="es-CL"/>
+          </a:p>
+        </p:txBody>
+      </p:sp>
+      <p:cxnSp>
+        <p:nvCxnSpPr>
+          <p:cNvPr id="17" name="16 Conector recto"/>
+          <p:cNvCxnSpPr>
+            <a:stCxn id="16" idx="4"/>
+          </p:cNvCxnSpPr>
+          <p:nvPr/>
+        </p:nvCxnSpPr>
+        <p:spPr>
+          <a:xfrm>
+            <a:off x="827584" y="5068867"/>
+            <a:ext cx="0" cy="720080"/>
+          </a:xfrm>
+          <a:prstGeom prst="line">
+            <a:avLst/>
+          </a:prstGeom>
+          <a:ln w="19050"/>
+        </p:spPr>
+        <p:style>
+          <a:lnRef idx="1">
+            <a:schemeClr val="accent6"/>
+          </a:lnRef>
+          <a:fillRef idx="0">
+            <a:schemeClr val="accent6"/>
+          </a:fillRef>
+          <a:effectRef idx="0">
+            <a:schemeClr val="accent6"/>
+          </a:effectRef>
+          <a:fontRef idx="minor">
+            <a:schemeClr val="tx1"/>
+          </a:fontRef>
+        </p:style>
+      </p:cxnSp>
+      <p:cxnSp>
+        <p:nvCxnSpPr>
+          <p:cNvPr id="18" name="17 Conector recto"/>
+          <p:cNvCxnSpPr/>
+          <p:nvPr/>
+        </p:nvCxnSpPr>
+        <p:spPr>
+          <a:xfrm>
+            <a:off x="575556" y="5356899"/>
+            <a:ext cx="576064" cy="0"/>
+          </a:xfrm>
+          <a:prstGeom prst="line">
+            <a:avLst/>
+          </a:prstGeom>
+          <a:ln w="19050"/>
+        </p:spPr>
+        <p:style>
+          <a:lnRef idx="1">
+            <a:schemeClr val="dk1"/>
+          </a:lnRef>
+          <a:fillRef idx="0">
+            <a:schemeClr val="dk1"/>
+          </a:fillRef>
+          <a:effectRef idx="0">
+            <a:schemeClr val="dk1"/>
+          </a:effectRef>
+          <a:fontRef idx="minor">
+            <a:schemeClr val="tx1"/>
+          </a:fontRef>
+        </p:style>
+      </p:cxnSp>
+      <p:cxnSp>
+        <p:nvCxnSpPr>
+          <p:cNvPr id="19" name="18 Conector recto"/>
+          <p:cNvCxnSpPr/>
+          <p:nvPr/>
+        </p:nvCxnSpPr>
+        <p:spPr>
+          <a:xfrm>
+            <a:off x="827584" y="5762982"/>
+            <a:ext cx="252028" cy="360040"/>
+          </a:xfrm>
+          <a:prstGeom prst="line">
+            <a:avLst/>
+          </a:prstGeom>
+          <a:ln w="19050"/>
+        </p:spPr>
+        <p:style>
+          <a:lnRef idx="1">
+            <a:schemeClr val="dk1"/>
+          </a:lnRef>
+          <a:fillRef idx="0">
+            <a:schemeClr val="dk1"/>
+          </a:fillRef>
+          <a:effectRef idx="0">
+            <a:schemeClr val="dk1"/>
+          </a:effectRef>
+          <a:fontRef idx="minor">
+            <a:schemeClr val="tx1"/>
+          </a:fontRef>
+        </p:style>
+      </p:cxnSp>
+      <p:cxnSp>
+        <p:nvCxnSpPr>
+          <p:cNvPr id="20" name="19 Conector recto"/>
+          <p:cNvCxnSpPr/>
+          <p:nvPr/>
+        </p:nvCxnSpPr>
+        <p:spPr>
+          <a:xfrm flipH="1">
+            <a:off x="575556" y="5762982"/>
+            <a:ext cx="252028" cy="360040"/>
+          </a:xfrm>
+          <a:prstGeom prst="line">
+            <a:avLst/>
+          </a:prstGeom>
+          <a:ln w="19050"/>
+        </p:spPr>
+        <p:style>
+          <a:lnRef idx="1">
+            <a:schemeClr val="dk1"/>
+          </a:lnRef>
+          <a:fillRef idx="0">
+            <a:schemeClr val="dk1"/>
+          </a:fillRef>
+          <a:effectRef idx="0">
+            <a:schemeClr val="dk1"/>
+          </a:effectRef>
+          <a:fontRef idx="minor">
+            <a:schemeClr val="tx1"/>
+          </a:fontRef>
+        </p:style>
+      </p:cxnSp>
+      <p:sp>
+        <p:nvSpPr>
+          <p:cNvPr id="21" name="20 Cara sonriente"/>
+          <p:cNvSpPr/>
+          <p:nvPr/>
+        </p:nvSpPr>
+        <p:spPr>
+          <a:xfrm>
+            <a:off x="7452320" y="2661604"/>
+            <a:ext cx="504056" cy="504056"/>
+          </a:xfrm>
+          <a:prstGeom prst="smileyFace">
+            <a:avLst/>
+          </a:prstGeom>
+        </p:spPr>
+        <p:style>
+          <a:lnRef idx="2">
+            <a:schemeClr val="accent6"/>
+          </a:lnRef>
+          <a:fillRef idx="1">
+            <a:schemeClr val="lt1"/>
+          </a:fillRef>
+          <a:effectRef idx="0">
+            <a:schemeClr val="accent6"/>
+          </a:effectRef>
+          <a:fontRef idx="minor">
+            <a:schemeClr val="dk1"/>
+          </a:fontRef>
+        </p:style>
+        <p:txBody>
+          <a:bodyPr rtlCol="0" anchor="ctr"/>
+          <a:lstStyle/>
+          <a:p>
+            <a:pPr algn="ctr"/>
+            <a:endParaRPr lang="es-CL"/>
+          </a:p>
+        </p:txBody>
+      </p:sp>
+      <p:cxnSp>
+        <p:nvCxnSpPr>
+          <p:cNvPr id="22" name="21 Conector recto"/>
+          <p:cNvCxnSpPr>
+            <a:stCxn id="21" idx="4"/>
+          </p:cNvCxnSpPr>
+          <p:nvPr/>
+        </p:nvCxnSpPr>
+        <p:spPr>
+          <a:xfrm>
+            <a:off x="7704348" y="3165660"/>
+            <a:ext cx="0" cy="720080"/>
+          </a:xfrm>
+          <a:prstGeom prst="line">
+            <a:avLst/>
+          </a:prstGeom>
+          <a:ln w="19050"/>
+        </p:spPr>
+        <p:style>
+          <a:lnRef idx="1">
+            <a:schemeClr val="accent6"/>
+          </a:lnRef>
+          <a:fillRef idx="0">
+            <a:schemeClr val="accent6"/>
+          </a:fillRef>
+          <a:effectRef idx="0">
+            <a:schemeClr val="accent6"/>
+          </a:effectRef>
+          <a:fontRef idx="minor">
+            <a:schemeClr val="tx1"/>
+          </a:fontRef>
+        </p:style>
+      </p:cxnSp>
+      <p:cxnSp>
+        <p:nvCxnSpPr>
+          <p:cNvPr id="23" name="22 Conector recto"/>
+          <p:cNvCxnSpPr/>
+          <p:nvPr/>
+        </p:nvCxnSpPr>
+        <p:spPr>
+          <a:xfrm>
+            <a:off x="7452320" y="3453692"/>
+            <a:ext cx="576064" cy="0"/>
+          </a:xfrm>
+          <a:prstGeom prst="line">
+            <a:avLst/>
+          </a:prstGeom>
+          <a:ln w="19050"/>
+        </p:spPr>
+        <p:style>
+          <a:lnRef idx="1">
+            <a:schemeClr val="dk1"/>
+          </a:lnRef>
+          <a:fillRef idx="0">
+            <a:schemeClr val="dk1"/>
+          </a:fillRef>
+          <a:effectRef idx="0">
+            <a:schemeClr val="dk1"/>
+          </a:effectRef>
+          <a:fontRef idx="minor">
+            <a:schemeClr val="tx1"/>
+          </a:fontRef>
+        </p:style>
+      </p:cxnSp>
+      <p:cxnSp>
+        <p:nvCxnSpPr>
+          <p:cNvPr id="24" name="23 Conector recto"/>
+          <p:cNvCxnSpPr/>
+          <p:nvPr/>
+        </p:nvCxnSpPr>
+        <p:spPr>
+          <a:xfrm>
+            <a:off x="7704348" y="3859775"/>
+            <a:ext cx="252028" cy="360040"/>
+          </a:xfrm>
+          <a:prstGeom prst="line">
+            <a:avLst/>
+          </a:prstGeom>
+          <a:ln w="19050"/>
+        </p:spPr>
+        <p:style>
+          <a:lnRef idx="1">
+            <a:schemeClr val="dk1"/>
+          </a:lnRef>
+          <a:fillRef idx="0">
+            <a:schemeClr val="dk1"/>
+          </a:fillRef>
+          <a:effectRef idx="0">
+            <a:schemeClr val="dk1"/>
+          </a:effectRef>
+          <a:fontRef idx="minor">
+            <a:schemeClr val="tx1"/>
+          </a:fontRef>
+        </p:style>
+      </p:cxnSp>
+      <p:cxnSp>
+        <p:nvCxnSpPr>
+          <p:cNvPr id="25" name="24 Conector recto"/>
+          <p:cNvCxnSpPr/>
+          <p:nvPr/>
+        </p:nvCxnSpPr>
+        <p:spPr>
+          <a:xfrm flipH="1">
+            <a:off x="7452320" y="3859775"/>
+            <a:ext cx="252028" cy="360040"/>
+          </a:xfrm>
+          <a:prstGeom prst="line">
+            <a:avLst/>
+          </a:prstGeom>
+          <a:ln w="19050"/>
+        </p:spPr>
+        <p:style>
+          <a:lnRef idx="1">
+            <a:schemeClr val="dk1"/>
+          </a:lnRef>
+          <a:fillRef idx="0">
+            <a:schemeClr val="dk1"/>
+          </a:fillRef>
+          <a:effectRef idx="0">
+            <a:schemeClr val="dk1"/>
+          </a:effectRef>
+          <a:fontRef idx="minor">
+            <a:schemeClr val="tx1"/>
+          </a:fontRef>
+        </p:style>
+      </p:cxnSp>
+      <p:sp>
+        <p:nvSpPr>
+          <p:cNvPr id="26" name="25 CuadroTexto"/>
+          <p:cNvSpPr txBox="1"/>
+          <p:nvPr/>
+        </p:nvSpPr>
+        <p:spPr>
+          <a:xfrm>
+            <a:off x="395536" y="3466137"/>
+            <a:ext cx="936104" cy="338554"/>
+          </a:xfrm>
+          <a:prstGeom prst="rect">
+            <a:avLst/>
+          </a:prstGeom>
+          <a:noFill/>
+        </p:spPr>
+        <p:txBody>
+          <a:bodyPr wrap="square" rtlCol="0">
+            <a:spAutoFit/>
+          </a:bodyPr>
+          <a:lstStyle/>
+          <a:p>
+            <a:r>
+              <a:rPr lang="es-CL" sz="1600" dirty="0" smtClean="0"/>
+              <a:t>alumno</a:t>
+            </a:r>
+            <a:endParaRPr lang="es-CL" sz="1600" dirty="0"/>
+          </a:p>
+        </p:txBody>
+      </p:sp>
+      <p:sp>
+        <p:nvSpPr>
+          <p:cNvPr id="27" name="26 CuadroTexto"/>
+          <p:cNvSpPr txBox="1"/>
+          <p:nvPr/>
+        </p:nvSpPr>
+        <p:spPr>
+          <a:xfrm>
+            <a:off x="365910" y="6154867"/>
+            <a:ext cx="936104" cy="338554"/>
+          </a:xfrm>
+          <a:prstGeom prst="rect">
+            <a:avLst/>
+          </a:prstGeom>
+          <a:noFill/>
+        </p:spPr>
+        <p:txBody>
+          <a:bodyPr wrap="square" rtlCol="0">
+            <a:spAutoFit/>
+          </a:bodyPr>
+          <a:lstStyle/>
+          <a:p>
+            <a:r>
+              <a:rPr lang="es-CL" sz="1600" dirty="0" smtClean="0"/>
+              <a:t>profesor</a:t>
+            </a:r>
+            <a:endParaRPr lang="es-CL" sz="1600" dirty="0"/>
+          </a:p>
+        </p:txBody>
+      </p:sp>
+      <p:sp>
+        <p:nvSpPr>
+          <p:cNvPr id="28" name="27 CuadroTexto"/>
+          <p:cNvSpPr txBox="1"/>
+          <p:nvPr/>
+        </p:nvSpPr>
+        <p:spPr>
+          <a:xfrm>
+            <a:off x="6963509" y="4269649"/>
+            <a:ext cx="1481678" cy="338554"/>
+          </a:xfrm>
+          <a:prstGeom prst="rect">
+            <a:avLst/>
+          </a:prstGeom>
+          <a:noFill/>
+        </p:spPr>
+        <p:txBody>
+          <a:bodyPr wrap="square" rtlCol="0">
+            <a:spAutoFit/>
+          </a:bodyPr>
+          <a:lstStyle/>
+          <a:p>
+            <a:r>
+              <a:rPr lang="es-CL" sz="1600" dirty="0" smtClean="0"/>
+              <a:t>administrador</a:t>
+            </a:r>
+            <a:endParaRPr lang="es-CL" sz="1600" dirty="0"/>
+          </a:p>
+        </p:txBody>
+      </p:sp>
+      <p:sp>
+        <p:nvSpPr>
+          <p:cNvPr id="29" name="28 Elipse"/>
+          <p:cNvSpPr/>
+          <p:nvPr/>
+        </p:nvSpPr>
+        <p:spPr>
+          <a:xfrm>
+            <a:off x="3316543" y="1621190"/>
+            <a:ext cx="1872208" cy="725114"/>
+          </a:xfrm>
+          <a:prstGeom prst="ellipse">
+            <a:avLst/>
+          </a:prstGeom>
+        </p:spPr>
+        <p:style>
+          <a:lnRef idx="2">
+            <a:schemeClr val="accent6"/>
+          </a:lnRef>
+          <a:fillRef idx="1">
+            <a:schemeClr val="lt1"/>
+          </a:fillRef>
+          <a:effectRef idx="0">
+            <a:schemeClr val="accent6"/>
+          </a:effectRef>
+          <a:fontRef idx="minor">
+            <a:schemeClr val="dk1"/>
+          </a:fontRef>
+        </p:style>
+        <p:txBody>
+          <a:bodyPr rtlCol="0" anchor="ctr"/>
+          <a:lstStyle/>
+          <a:p>
+            <a:pPr algn="ctr"/>
+            <a:endParaRPr lang="es-CL"/>
+          </a:p>
+        </p:txBody>
+      </p:sp>
+      <p:sp>
+        <p:nvSpPr>
+          <p:cNvPr id="30" name="29 Elipse"/>
+          <p:cNvSpPr/>
+          <p:nvPr/>
+        </p:nvSpPr>
+        <p:spPr>
+          <a:xfrm>
+            <a:off x="3316543" y="2404635"/>
+            <a:ext cx="1872208" cy="725114"/>
+          </a:xfrm>
+          <a:prstGeom prst="ellipse">
+            <a:avLst/>
+          </a:prstGeom>
+        </p:spPr>
+        <p:style>
+          <a:lnRef idx="2">
+            <a:schemeClr val="accent6"/>
+          </a:lnRef>
+          <a:fillRef idx="1">
+            <a:schemeClr val="lt1"/>
+          </a:fillRef>
+          <a:effectRef idx="0">
+            <a:schemeClr val="accent6"/>
+          </a:effectRef>
+          <a:fontRef idx="minor">
+            <a:schemeClr val="dk1"/>
+          </a:fontRef>
+        </p:style>
+        <p:txBody>
+          <a:bodyPr rtlCol="0" anchor="ctr"/>
+          <a:lstStyle/>
+          <a:p>
+            <a:pPr algn="ctr"/>
+            <a:endParaRPr lang="es-CL"/>
+          </a:p>
+        </p:txBody>
+      </p:sp>
+      <p:sp>
+        <p:nvSpPr>
+          <p:cNvPr id="31" name="30 Elipse"/>
+          <p:cNvSpPr/>
+          <p:nvPr/>
+        </p:nvSpPr>
+        <p:spPr>
+          <a:xfrm>
+            <a:off x="3298078" y="3191791"/>
+            <a:ext cx="1872208" cy="725114"/>
+          </a:xfrm>
+          <a:prstGeom prst="ellipse">
+            <a:avLst/>
+          </a:prstGeom>
+        </p:spPr>
+        <p:style>
+          <a:lnRef idx="2">
+            <a:schemeClr val="accent6"/>
+          </a:lnRef>
+          <a:fillRef idx="1">
+            <a:schemeClr val="lt1"/>
+          </a:fillRef>
+          <a:effectRef idx="0">
+            <a:schemeClr val="accent6"/>
+          </a:effectRef>
+          <a:fontRef idx="minor">
+            <a:schemeClr val="dk1"/>
+          </a:fontRef>
+        </p:style>
+        <p:txBody>
+          <a:bodyPr rtlCol="0" anchor="ctr"/>
+          <a:lstStyle/>
+          <a:p>
+            <a:pPr algn="ctr"/>
+            <a:endParaRPr lang="es-CL"/>
+          </a:p>
+        </p:txBody>
+      </p:sp>
+      <p:sp>
+        <p:nvSpPr>
+          <p:cNvPr id="32" name="31 CuadroTexto"/>
+          <p:cNvSpPr txBox="1"/>
+          <p:nvPr/>
+        </p:nvSpPr>
+        <p:spPr>
+          <a:xfrm>
+            <a:off x="3367883" y="1829858"/>
+            <a:ext cx="2016224" cy="307777"/>
+          </a:xfrm>
+          <a:prstGeom prst="rect">
+            <a:avLst/>
+          </a:prstGeom>
+          <a:noFill/>
+        </p:spPr>
+        <p:txBody>
+          <a:bodyPr wrap="square" rtlCol="0">
+            <a:spAutoFit/>
+          </a:bodyPr>
+          <a:lstStyle/>
+          <a:p>
+            <a:r>
+              <a:rPr lang="es-CL" sz="1400" dirty="0" smtClean="0"/>
+              <a:t>Responder encuesta</a:t>
+            </a:r>
+            <a:endParaRPr lang="es-CL" sz="1400" dirty="0"/>
+          </a:p>
+        </p:txBody>
+      </p:sp>
+      <p:sp>
+        <p:nvSpPr>
+          <p:cNvPr id="33" name="32 CuadroTexto"/>
+          <p:cNvSpPr txBox="1"/>
+          <p:nvPr/>
+        </p:nvSpPr>
+        <p:spPr>
+          <a:xfrm>
+            <a:off x="3462247" y="2613303"/>
+            <a:ext cx="1800200" cy="307777"/>
+          </a:xfrm>
+          <a:prstGeom prst="rect">
+            <a:avLst/>
+          </a:prstGeom>
+          <a:noFill/>
+        </p:spPr>
+        <p:txBody>
+          <a:bodyPr wrap="square" rtlCol="0">
+            <a:spAutoFit/>
+          </a:bodyPr>
+          <a:lstStyle/>
+          <a:p>
+            <a:r>
+              <a:rPr lang="es-CL" sz="1400" dirty="0" smtClean="0"/>
+              <a:t>Proponer plantilla</a:t>
+            </a:r>
+            <a:endParaRPr lang="es-CL" sz="1400" dirty="0"/>
+          </a:p>
+        </p:txBody>
+      </p:sp>
+      <p:sp>
+        <p:nvSpPr>
+          <p:cNvPr id="34" name="33 CuadroTexto"/>
+          <p:cNvSpPr txBox="1"/>
+          <p:nvPr/>
+        </p:nvSpPr>
+        <p:spPr>
+          <a:xfrm>
+            <a:off x="3576231" y="3400459"/>
+            <a:ext cx="2088232" cy="307777"/>
+          </a:xfrm>
+          <a:prstGeom prst="rect">
+            <a:avLst/>
+          </a:prstGeom>
+          <a:noFill/>
+        </p:spPr>
+        <p:txBody>
+          <a:bodyPr wrap="square" rtlCol="0">
+            <a:spAutoFit/>
+          </a:bodyPr>
+          <a:lstStyle/>
+          <a:p>
+            <a:r>
+              <a:rPr lang="es-CL" sz="1400" dirty="0" smtClean="0"/>
+              <a:t>Valorar plantilla</a:t>
+            </a:r>
+            <a:endParaRPr lang="es-CL" sz="1400" dirty="0"/>
+          </a:p>
+        </p:txBody>
+      </p:sp>
+      <p:sp>
+        <p:nvSpPr>
+          <p:cNvPr id="35" name="34 Elipse"/>
+          <p:cNvSpPr/>
+          <p:nvPr/>
+        </p:nvSpPr>
+        <p:spPr>
+          <a:xfrm>
+            <a:off x="3316543" y="4091725"/>
+            <a:ext cx="1872208" cy="725114"/>
+          </a:xfrm>
+          <a:prstGeom prst="ellipse">
+            <a:avLst/>
+          </a:prstGeom>
+        </p:spPr>
+        <p:style>
+          <a:lnRef idx="2">
+            <a:schemeClr val="accent6"/>
+          </a:lnRef>
+          <a:fillRef idx="1">
+            <a:schemeClr val="lt1"/>
+          </a:fillRef>
+          <a:effectRef idx="0">
+            <a:schemeClr val="accent6"/>
+          </a:effectRef>
+          <a:fontRef idx="minor">
+            <a:schemeClr val="dk1"/>
+          </a:fontRef>
+        </p:style>
+        <p:txBody>
+          <a:bodyPr rtlCol="0" anchor="ctr"/>
+          <a:lstStyle/>
+          <a:p>
+            <a:pPr algn="ctr"/>
+            <a:endParaRPr lang="es-CL"/>
+          </a:p>
+        </p:txBody>
+      </p:sp>
+      <p:sp>
+        <p:nvSpPr>
+          <p:cNvPr id="36" name="35 Elipse"/>
+          <p:cNvSpPr/>
+          <p:nvPr/>
+        </p:nvSpPr>
+        <p:spPr>
+          <a:xfrm>
+            <a:off x="3330191" y="4928196"/>
+            <a:ext cx="1872208" cy="725114"/>
+          </a:xfrm>
+          <a:prstGeom prst="ellipse">
+            <a:avLst/>
+          </a:prstGeom>
+        </p:spPr>
+        <p:style>
+          <a:lnRef idx="2">
+            <a:schemeClr val="accent6"/>
+          </a:lnRef>
+          <a:fillRef idx="1">
+            <a:schemeClr val="lt1"/>
+          </a:fillRef>
+          <a:effectRef idx="0">
+            <a:schemeClr val="accent6"/>
+          </a:effectRef>
+          <a:fontRef idx="minor">
+            <a:schemeClr val="dk1"/>
+          </a:fontRef>
+        </p:style>
+        <p:txBody>
+          <a:bodyPr rtlCol="0" anchor="ctr"/>
+          <a:lstStyle/>
+          <a:p>
+            <a:pPr algn="ctr"/>
+            <a:endParaRPr lang="es-CL"/>
+          </a:p>
+        </p:txBody>
+      </p:sp>
+      <p:sp>
+        <p:nvSpPr>
+          <p:cNvPr id="37" name="36 Elipse"/>
+          <p:cNvSpPr/>
+          <p:nvPr/>
+        </p:nvSpPr>
+        <p:spPr>
+          <a:xfrm>
+            <a:off x="3350984" y="5780521"/>
+            <a:ext cx="1872208" cy="725114"/>
+          </a:xfrm>
+          <a:prstGeom prst="ellipse">
+            <a:avLst/>
+          </a:prstGeom>
+        </p:spPr>
+        <p:style>
+          <a:lnRef idx="2">
+            <a:schemeClr val="accent6"/>
+          </a:lnRef>
+          <a:fillRef idx="1">
+            <a:schemeClr val="lt1"/>
+          </a:fillRef>
+          <a:effectRef idx="0">
+            <a:schemeClr val="accent6"/>
+          </a:effectRef>
+          <a:fontRef idx="minor">
+            <a:schemeClr val="dk1"/>
+          </a:fontRef>
+        </p:style>
+        <p:txBody>
+          <a:bodyPr rtlCol="0" anchor="ctr"/>
+          <a:lstStyle/>
+          <a:p>
+            <a:pPr algn="ctr"/>
+            <a:endParaRPr lang="es-CL"/>
+          </a:p>
+        </p:txBody>
+      </p:sp>
+      <p:sp>
+        <p:nvSpPr>
+          <p:cNvPr id="38" name="37 CuadroTexto"/>
+          <p:cNvSpPr txBox="1"/>
+          <p:nvPr/>
+        </p:nvSpPr>
+        <p:spPr>
+          <a:xfrm>
+            <a:off x="3367883" y="4300393"/>
+            <a:ext cx="2016224" cy="307777"/>
+          </a:xfrm>
+          <a:prstGeom prst="rect">
+            <a:avLst/>
+          </a:prstGeom>
+          <a:noFill/>
+        </p:spPr>
+        <p:txBody>
+          <a:bodyPr wrap="square" rtlCol="0">
+            <a:spAutoFit/>
+          </a:bodyPr>
+          <a:lstStyle/>
+          <a:p>
+            <a:r>
+              <a:rPr lang="es-CL" sz="1400" dirty="0" smtClean="0"/>
+              <a:t>Administrar módulo</a:t>
+            </a:r>
+            <a:endParaRPr lang="es-CL" sz="1400" dirty="0"/>
+          </a:p>
+        </p:txBody>
+      </p:sp>
+      <p:sp>
+        <p:nvSpPr>
+          <p:cNvPr id="39" name="38 CuadroTexto"/>
+          <p:cNvSpPr txBox="1"/>
+          <p:nvPr/>
+        </p:nvSpPr>
+        <p:spPr>
+          <a:xfrm>
+            <a:off x="3475895" y="5136864"/>
+            <a:ext cx="1800200" cy="523220"/>
+          </a:xfrm>
+          <a:prstGeom prst="rect">
+            <a:avLst/>
+          </a:prstGeom>
+          <a:noFill/>
+        </p:spPr>
+        <p:txBody>
+          <a:bodyPr wrap="square" rtlCol="0">
+            <a:spAutoFit/>
+          </a:bodyPr>
+          <a:lstStyle/>
+          <a:p>
+            <a:r>
+              <a:rPr lang="es-CL" sz="1400" dirty="0" smtClean="0"/>
+              <a:t>Administrar plantilla</a:t>
+            </a:r>
+          </a:p>
+          <a:p>
+            <a:endParaRPr lang="es-CL" sz="1400" dirty="0"/>
+          </a:p>
+        </p:txBody>
+      </p:sp>
+      <p:sp>
+        <p:nvSpPr>
+          <p:cNvPr id="45" name="44 CuadroTexto"/>
+          <p:cNvSpPr txBox="1"/>
+          <p:nvPr/>
+        </p:nvSpPr>
+        <p:spPr>
+          <a:xfrm>
+            <a:off x="3422992" y="6023142"/>
+            <a:ext cx="1800200" cy="523220"/>
+          </a:xfrm>
+          <a:prstGeom prst="rect">
+            <a:avLst/>
+          </a:prstGeom>
+          <a:noFill/>
+        </p:spPr>
+        <p:txBody>
+          <a:bodyPr wrap="square" rtlCol="0">
+            <a:spAutoFit/>
+          </a:bodyPr>
+          <a:lstStyle/>
+          <a:p>
+            <a:r>
+              <a:rPr lang="es-CL" sz="1400" dirty="0" smtClean="0"/>
+              <a:t>Administrar usuarios</a:t>
+            </a:r>
+          </a:p>
+          <a:p>
+            <a:endParaRPr lang="es-CL" sz="1400" dirty="0"/>
+          </a:p>
+        </p:txBody>
+      </p:sp>
+      <p:cxnSp>
+        <p:nvCxnSpPr>
+          <p:cNvPr id="5" name="4 Conector recto"/>
+          <p:cNvCxnSpPr>
+            <a:endCxn id="29" idx="2"/>
+          </p:cNvCxnSpPr>
+          <p:nvPr/>
+        </p:nvCxnSpPr>
+        <p:spPr>
+          <a:xfrm flipV="1">
+            <a:off x="1302014" y="1983747"/>
+            <a:ext cx="2014529" cy="677857"/>
+          </a:xfrm>
+          <a:prstGeom prst="line">
+            <a:avLst/>
+          </a:prstGeom>
+          <a:ln>
+            <a:solidFill>
+              <a:schemeClr val="tx1"/>
+            </a:solidFill>
+          </a:ln>
+        </p:spPr>
+        <p:style>
+          <a:lnRef idx="1">
+            <a:schemeClr val="accent1"/>
+          </a:lnRef>
+          <a:fillRef idx="0">
+            <a:schemeClr val="accent1"/>
+          </a:fillRef>
+          <a:effectRef idx="0">
+            <a:schemeClr val="accent1"/>
+          </a:effectRef>
+          <a:fontRef idx="minor">
+            <a:schemeClr val="tx1"/>
+          </a:fontRef>
+        </p:style>
+      </p:cxnSp>
+      <p:cxnSp>
+        <p:nvCxnSpPr>
+          <p:cNvPr id="47" name="46 Conector recto"/>
+          <p:cNvCxnSpPr>
+            <a:endCxn id="30" idx="2"/>
+          </p:cNvCxnSpPr>
+          <p:nvPr/>
+        </p:nvCxnSpPr>
+        <p:spPr>
+          <a:xfrm>
+            <a:off x="1331640" y="2661604"/>
+            <a:ext cx="1984903" cy="105588"/>
+          </a:xfrm>
+          <a:prstGeom prst="line">
+            <a:avLst/>
+          </a:prstGeom>
+          <a:ln>
+            <a:solidFill>
+              <a:schemeClr val="tx1"/>
+            </a:solidFill>
+          </a:ln>
+        </p:spPr>
+        <p:style>
+          <a:lnRef idx="1">
+            <a:schemeClr val="accent1"/>
+          </a:lnRef>
+          <a:fillRef idx="0">
+            <a:schemeClr val="accent1"/>
+          </a:fillRef>
+          <a:effectRef idx="0">
+            <a:schemeClr val="accent1"/>
+          </a:effectRef>
+          <a:fontRef idx="minor">
+            <a:schemeClr val="tx1"/>
+          </a:fontRef>
+        </p:style>
+      </p:cxnSp>
+      <p:cxnSp>
+        <p:nvCxnSpPr>
+          <p:cNvPr id="48" name="47 Conector recto"/>
+          <p:cNvCxnSpPr>
+            <a:endCxn id="31" idx="2"/>
+          </p:cNvCxnSpPr>
+          <p:nvPr/>
+        </p:nvCxnSpPr>
+        <p:spPr>
+          <a:xfrm>
+            <a:off x="1339821" y="2672292"/>
+            <a:ext cx="1958257" cy="882056"/>
+          </a:xfrm>
+          <a:prstGeom prst="line">
+            <a:avLst/>
+          </a:prstGeom>
+          <a:ln>
+            <a:solidFill>
+              <a:schemeClr val="tx1"/>
+            </a:solidFill>
+          </a:ln>
+        </p:spPr>
+        <p:style>
+          <a:lnRef idx="1">
+            <a:schemeClr val="accent1"/>
+          </a:lnRef>
+          <a:fillRef idx="0">
+            <a:schemeClr val="accent1"/>
+          </a:fillRef>
+          <a:effectRef idx="0">
+            <a:schemeClr val="accent1"/>
+          </a:effectRef>
+          <a:fontRef idx="minor">
+            <a:schemeClr val="tx1"/>
+          </a:fontRef>
+        </p:style>
+      </p:cxnSp>
+      <p:cxnSp>
+        <p:nvCxnSpPr>
+          <p:cNvPr id="15" name="14 Conector recto"/>
+          <p:cNvCxnSpPr>
+            <a:endCxn id="35" idx="2"/>
+          </p:cNvCxnSpPr>
+          <p:nvPr/>
+        </p:nvCxnSpPr>
+        <p:spPr>
+          <a:xfrm flipV="1">
+            <a:off x="1302014" y="4454282"/>
+            <a:ext cx="2014529" cy="1199028"/>
+          </a:xfrm>
+          <a:prstGeom prst="line">
+            <a:avLst/>
+          </a:prstGeom>
+          <a:ln>
+            <a:solidFill>
+              <a:schemeClr val="tx1"/>
+            </a:solidFill>
+          </a:ln>
+        </p:spPr>
+        <p:style>
+          <a:lnRef idx="1">
+            <a:schemeClr val="accent1"/>
+          </a:lnRef>
+          <a:fillRef idx="0">
+            <a:schemeClr val="accent1"/>
+          </a:fillRef>
+          <a:effectRef idx="0">
+            <a:schemeClr val="accent1"/>
+          </a:effectRef>
+          <a:fontRef idx="minor">
+            <a:schemeClr val="tx1"/>
+          </a:fontRef>
+        </p:style>
+      </p:cxnSp>
+      <p:cxnSp>
+        <p:nvCxnSpPr>
+          <p:cNvPr id="49" name="48 Conector recto"/>
+          <p:cNvCxnSpPr>
+            <a:endCxn id="36" idx="2"/>
+          </p:cNvCxnSpPr>
+          <p:nvPr/>
+        </p:nvCxnSpPr>
+        <p:spPr>
+          <a:xfrm flipV="1">
+            <a:off x="1302014" y="5290753"/>
+            <a:ext cx="2028177" cy="369331"/>
+          </a:xfrm>
+          <a:prstGeom prst="line">
+            <a:avLst/>
+          </a:prstGeom>
+          <a:ln>
+            <a:solidFill>
+              <a:schemeClr val="tx1"/>
+            </a:solidFill>
+          </a:ln>
+        </p:spPr>
+        <p:style>
+          <a:lnRef idx="1">
+            <a:schemeClr val="accent1"/>
+          </a:lnRef>
+          <a:fillRef idx="0">
+            <a:schemeClr val="accent1"/>
+          </a:fillRef>
+          <a:effectRef idx="0">
+            <a:schemeClr val="accent1"/>
+          </a:effectRef>
+          <a:fontRef idx="minor">
+            <a:schemeClr val="tx1"/>
+          </a:fontRef>
+        </p:style>
+      </p:cxnSp>
+      <p:cxnSp>
+        <p:nvCxnSpPr>
+          <p:cNvPr id="56" name="55 Conector recto"/>
+          <p:cNvCxnSpPr/>
+          <p:nvPr/>
+        </p:nvCxnSpPr>
+        <p:spPr>
+          <a:xfrm flipH="1">
+            <a:off x="5170287" y="3706748"/>
+            <a:ext cx="2282033" cy="747534"/>
+          </a:xfrm>
+          <a:prstGeom prst="line">
+            <a:avLst/>
+          </a:prstGeom>
+          <a:ln>
+            <a:solidFill>
+              <a:schemeClr val="tx1"/>
+            </a:solidFill>
+          </a:ln>
+        </p:spPr>
+        <p:style>
+          <a:lnRef idx="1">
+            <a:schemeClr val="accent1"/>
+          </a:lnRef>
+          <a:fillRef idx="0">
+            <a:schemeClr val="accent1"/>
+          </a:fillRef>
+          <a:effectRef idx="0">
+            <a:schemeClr val="accent1"/>
+          </a:effectRef>
+          <a:fontRef idx="minor">
+            <a:schemeClr val="tx1"/>
+          </a:fontRef>
+        </p:style>
+      </p:cxnSp>
+      <p:cxnSp>
+        <p:nvCxnSpPr>
+          <p:cNvPr id="58" name="57 Conector recto"/>
+          <p:cNvCxnSpPr/>
+          <p:nvPr/>
+        </p:nvCxnSpPr>
+        <p:spPr>
+          <a:xfrm flipH="1">
+            <a:off x="5188489" y="3723170"/>
+            <a:ext cx="2238234" cy="1542197"/>
+          </a:xfrm>
+          <a:prstGeom prst="line">
+            <a:avLst/>
+          </a:prstGeom>
+          <a:ln>
+            <a:solidFill>
+              <a:schemeClr val="tx1"/>
+            </a:solidFill>
+          </a:ln>
+        </p:spPr>
+        <p:style>
+          <a:lnRef idx="1">
+            <a:schemeClr val="accent1"/>
+          </a:lnRef>
+          <a:fillRef idx="0">
+            <a:schemeClr val="accent1"/>
+          </a:fillRef>
+          <a:effectRef idx="0">
+            <a:schemeClr val="accent1"/>
+          </a:effectRef>
+          <a:fontRef idx="minor">
+            <a:schemeClr val="tx1"/>
+          </a:fontRef>
+        </p:style>
+      </p:cxnSp>
+      <p:cxnSp>
+        <p:nvCxnSpPr>
+          <p:cNvPr id="59" name="58 Conector recto"/>
+          <p:cNvCxnSpPr>
+            <a:endCxn id="37" idx="6"/>
+          </p:cNvCxnSpPr>
+          <p:nvPr/>
+        </p:nvCxnSpPr>
+        <p:spPr>
+          <a:xfrm flipH="1">
+            <a:off x="5223192" y="3723170"/>
+            <a:ext cx="2229129" cy="2419908"/>
+          </a:xfrm>
+          <a:prstGeom prst="line">
+            <a:avLst/>
+          </a:prstGeom>
+          <a:ln>
+            <a:solidFill>
+              <a:schemeClr val="tx1"/>
+            </a:solidFill>
+          </a:ln>
+        </p:spPr>
+        <p:style>
+          <a:lnRef idx="1">
+            <a:schemeClr val="accent1"/>
+          </a:lnRef>
+          <a:fillRef idx="0">
+            <a:schemeClr val="accent1"/>
+          </a:fillRef>
+          <a:effectRef idx="0">
+            <a:schemeClr val="accent1"/>
+          </a:effectRef>
+          <a:fontRef idx="minor">
+            <a:schemeClr val="tx1"/>
+          </a:fontRef>
+        </p:style>
+      </p:cxnSp>
     </p:spTree>
     <p:extLst>
       <p:ext uri="{BB962C8B-B14F-4D97-AF65-F5344CB8AC3E}">
@@ -4127,31 +4922,35 @@
       </p:grpSpPr>
       <p:sp>
         <p:nvSpPr>
+          <p:cNvPr id="3" name="2 Título"/>
+          <p:cNvSpPr>
+            <a:spLocks noGrp="1"/>
+          </p:cNvSpPr>
+          <p:nvPr>
+            <p:ph type="title"/>
+          </p:nvPr>
+        </p:nvSpPr>
+        <p:spPr/>
+        <p:txBody>
+          <a:bodyPr/>
+          <a:lstStyle/>
+          <a:p>
+            <a:r>
+              <a:rPr lang="es-CL" dirty="0" smtClean="0"/>
+              <a:t>Fin</a:t>
+            </a:r>
+            <a:endParaRPr lang="es-CL" dirty="0"/>
+          </a:p>
+        </p:txBody>
+      </p:sp>
+      <p:sp>
+        <p:nvSpPr>
           <p:cNvPr id="2" name="1 Marcador de contenido"/>
           <p:cNvSpPr>
             <a:spLocks noGrp="1"/>
           </p:cNvSpPr>
           <p:nvPr>
             <p:ph idx="1"/>
-          </p:nvPr>
-        </p:nvSpPr>
-        <p:spPr/>
-        <p:txBody>
-          <a:bodyPr/>
-          <a:lstStyle/>
-          <a:p>
-            <a:endParaRPr lang="es-CL"/>
-          </a:p>
-        </p:txBody>
-      </p:sp>
-      <p:sp>
-        <p:nvSpPr>
-          <p:cNvPr id="3" name="2 Título"/>
-          <p:cNvSpPr>
-            <a:spLocks noGrp="1"/>
-          </p:cNvSpPr>
-          <p:nvPr>
-            <p:ph type="title"/>
           </p:nvPr>
         </p:nvSpPr>
         <p:spPr/>
@@ -4173,61 +4972,103 @@
   <p:clrMapOvr>
     <a:masterClrMapping/>
   </p:clrMapOvr>
+  <p:timing>
+    <p:tnLst>
+      <p:par>
+        <p:cTn id="1" dur="indefinite" restart="never" nodeType="tmRoot"/>
+      </p:par>
+    </p:tnLst>
+  </p:timing>
 </p:sld>
 </file>
 
 <file path=ppt/theme/theme1.xml><?xml version="1.0" encoding="utf-8"?>
-<a:theme xmlns:a="http://schemas.openxmlformats.org/drawingml/2006/main" name="Cuadrícula">
+<a:theme xmlns:a="http://schemas.openxmlformats.org/drawingml/2006/main" name="Adyacencia">
   <a:themeElements>
-    <a:clrScheme name="Cuadrícula">
+    <a:clrScheme name="Adyacencia">
       <a:dk1>
-        <a:sysClr val="windowText" lastClr="000000"/>
+        <a:srgbClr val="2F2B20"/>
       </a:dk1>
       <a:lt1>
-        <a:sysClr val="window" lastClr="FFFFFF"/>
+        <a:srgbClr val="FFFFFF"/>
       </a:lt1>
       <a:dk2>
-        <a:srgbClr val="534949"/>
+        <a:srgbClr val="675E47"/>
       </a:dk2>
       <a:lt2>
-        <a:srgbClr val="CCD1B9"/>
+        <a:srgbClr val="DFDCB7"/>
       </a:lt2>
       <a:accent1>
-        <a:srgbClr val="C66951"/>
+        <a:srgbClr val="A9A57C"/>
       </a:accent1>
       <a:accent2>
-        <a:srgbClr val="BF974D"/>
+        <a:srgbClr val="9CBEBD"/>
       </a:accent2>
       <a:accent3>
-        <a:srgbClr val="928B70"/>
+        <a:srgbClr val="D2CB6C"/>
       </a:accent3>
       <a:accent4>
-        <a:srgbClr val="87706B"/>
+        <a:srgbClr val="95A39D"/>
       </a:accent4>
       <a:accent5>
-        <a:srgbClr val="94734E"/>
+        <a:srgbClr val="C89F5D"/>
       </a:accent5>
       <a:accent6>
-        <a:srgbClr val="6F777D"/>
+        <a:srgbClr val="B1A089"/>
       </a:accent6>
       <a:hlink>
-        <a:srgbClr val="CC9900"/>
+        <a:srgbClr val="D25814"/>
       </a:hlink>
       <a:folHlink>
-        <a:srgbClr val="C0C0C0"/>
+        <a:srgbClr val="849A0A"/>
       </a:folHlink>
     </a:clrScheme>
-    <a:fontScheme name="Cuadrícula">
+    <a:fontScheme name="Office">
       <a:majorFont>
-        <a:latin typeface="Franklin Gothic Medium"/>
+        <a:latin typeface="Cambria"/>
         <a:ea typeface=""/>
         <a:cs typeface=""/>
-        <a:font script="Jpan" typeface="HG創英角ｺﾞｼｯｸUB"/>
-        <a:font script="Hang" typeface="HY견고딕"/>
-        <a:font script="Hans" typeface="微软雅黑"/>
-        <a:font script="Hant" typeface="微軟正黑體"/>
-        <a:font script="Arab" typeface="Arial Bold"/>
-        <a:font script="Hebr" typeface="Arial Bold"/>
+        <a:font script="Jpan" typeface="ＭＳ ゴシック"/>
+        <a:font script="Hang" typeface="맑은 고딕"/>
+        <a:font script="Hans" typeface="宋体"/>
+        <a:font script="Hant" typeface="新細明體"/>
+        <a:font script="Arab" typeface="Times New Roman"/>
+        <a:font script="Hebr" typeface="Times New Roman"/>
+        <a:font script="Thai" typeface="Angsana New"/>
+        <a:font script="Ethi" typeface="Nyala"/>
+        <a:font script="Beng" typeface="Vrinda"/>
+        <a:font script="Gujr" typeface="Shruti"/>
+        <a:font script="Khmr" typeface="MoolBoran"/>
+        <a:font script="Knda" typeface="Tunga"/>
+        <a:font script="Guru" typeface="Raavi"/>
+        <a:font script="Cans" typeface="Euphemia"/>
+        <a:font script="Cher" typeface="Plantagenet Cherokee"/>
+        <a:font script="Yiii" typeface="Microsoft Yi Baiti"/>
+        <a:font script="Tibt" typeface="Microsoft Himalaya"/>
+        <a:font script="Thaa" typeface="MV Boli"/>
+        <a:font script="Deva" typeface="Mangal"/>
+        <a:font script="Telu" typeface="Gautami"/>
+        <a:font script="Taml" typeface="Latha"/>
+        <a:font script="Syrc" typeface="Estrangelo Edessa"/>
+        <a:font script="Orya" typeface="Kalinga"/>
+        <a:font script="Mlym" typeface="Kartika"/>
+        <a:font script="Laoo" typeface="DokChampa"/>
+        <a:font script="Sinh" typeface="Iskoola Pota"/>
+        <a:font script="Mong" typeface="Mongolian Baiti"/>
+        <a:font script="Viet" typeface="Times New Roman"/>
+        <a:font script="Uigh" typeface="Microsoft Uighur"/>
+        <a:font script="Geor" typeface="Sylfaen"/>
+      </a:majorFont>
+      <a:minorFont>
+        <a:latin typeface="Calibri"/>
+        <a:ea typeface=""/>
+        <a:cs typeface=""/>
+        <a:font script="Jpan" typeface="ＭＳ 明朝"/>
+        <a:font script="Hang" typeface="맑은 고딕"/>
+        <a:font script="Hans" typeface="宋体"/>
+        <a:font script="Hant" typeface="新細明體"/>
+        <a:font script="Arab" typeface="Arial"/>
+        <a:font script="Hebr" typeface="Arial"/>
         <a:font script="Thai" typeface="Cordia New"/>
         <a:font script="Ethi" typeface="Nyala"/>
         <a:font script="Beng" typeface="Vrinda"/>
@@ -4249,91 +5090,42 @@
         <a:font script="Laoo" typeface="DokChampa"/>
         <a:font script="Sinh" typeface="Iskoola Pota"/>
         <a:font script="Mong" typeface="Mongolian Baiti"/>
-        <a:font script="Viet" typeface="Arial Bold"/>
-        <a:font script="Uigh" typeface="Microsoft Uighur"/>
-        <a:font script="Geor" typeface="Sylfaen"/>
-      </a:majorFont>
-      <a:minorFont>
-        <a:latin typeface="Franklin Gothic Medium"/>
-        <a:ea typeface=""/>
-        <a:cs typeface=""/>
-        <a:font script="Jpan" typeface="HG創英角ｺﾞｼｯｸUB"/>
-        <a:font script="Hang" typeface="HY견고딕"/>
-        <a:font script="Hans" typeface="微软雅黑"/>
-        <a:font script="Hant" typeface="微軟正黑體"/>
-        <a:font script="Arab" typeface="Arial Bold"/>
-        <a:font script="Hebr" typeface="Arial Bold"/>
-        <a:font script="Thai" typeface="Cordia New"/>
-        <a:font script="Ethi" typeface="Nyala"/>
-        <a:font script="Beng" typeface="Vrinda"/>
-        <a:font script="Gujr" typeface="Shruti"/>
-        <a:font script="Khmr" typeface="DaunPenh"/>
-        <a:font script="Knda" typeface="Tunga"/>
-        <a:font script="Guru" typeface="Raavi"/>
-        <a:font script="Cans" typeface="Euphemia"/>
-        <a:font script="Cher" typeface="Plantagenet Cherokee"/>
-        <a:font script="Yiii" typeface="Microsoft Yi Baiti"/>
-        <a:font script="Tibt" typeface="Microsoft Himalaya"/>
-        <a:font script="Thaa" typeface="MV Boli"/>
-        <a:font script="Deva" typeface="Mangal"/>
-        <a:font script="Telu" typeface="Gautami"/>
-        <a:font script="Taml" typeface="Latha"/>
-        <a:font script="Syrc" typeface="Estrangelo Edessa"/>
-        <a:font script="Orya" typeface="Kalinga"/>
-        <a:font script="Mlym" typeface="Kartika"/>
-        <a:font script="Laoo" typeface="DokChampa"/>
-        <a:font script="Sinh" typeface="Iskoola Pota"/>
-        <a:font script="Mong" typeface="Mongolian Baiti"/>
-        <a:font script="Viet" typeface="Arial Bold"/>
+        <a:font script="Viet" typeface="Arial"/>
         <a:font script="Uigh" typeface="Microsoft Uighur"/>
         <a:font script="Geor" typeface="Sylfaen"/>
       </a:minorFont>
     </a:fontScheme>
-    <a:fmtScheme name="Cuadrícula">
+    <a:fmtScheme name="Adyacencia">
       <a:fillStyleLst>
         <a:solidFill>
           <a:schemeClr val="phClr"/>
         </a:solidFill>
         <a:solidFill>
           <a:schemeClr val="phClr">
-            <a:tint val="50000"/>
+            <a:tint val="55000"/>
           </a:schemeClr>
         </a:solidFill>
-        <a:gradFill rotWithShape="1">
-          <a:gsLst>
-            <a:gs pos="0">
-              <a:schemeClr val="phClr"/>
-            </a:gs>
-            <a:gs pos="90000">
-              <a:schemeClr val="phClr">
-                <a:shade val="100000"/>
-              </a:schemeClr>
-            </a:gs>
-            <a:gs pos="100000">
-              <a:schemeClr val="phClr">
-                <a:shade val="85000"/>
-              </a:schemeClr>
-            </a:gs>
-          </a:gsLst>
-          <a:path path="circle">
-            <a:fillToRect l="100000" t="100000" r="100000" b="100000"/>
-          </a:path>
-        </a:gradFill>
+        <a:solidFill>
+          <a:schemeClr val="phClr"/>
+        </a:solidFill>
       </a:fillStyleLst>
       <a:lnStyleLst>
-        <a:ln w="10000" cap="flat" cmpd="sng" algn="ctr">
+        <a:ln w="12700" cap="flat" cmpd="sng" algn="ctr">
+          <a:solidFill>
+            <a:schemeClr val="phClr">
+              <a:shade val="95000"/>
+              <a:satMod val="105000"/>
+            </a:schemeClr>
+          </a:solidFill>
+          <a:prstDash val="solid"/>
+        </a:ln>
+        <a:ln w="25400" cap="flat" cmpd="sng" algn="ctr">
           <a:solidFill>
             <a:schemeClr val="phClr"/>
           </a:solidFill>
           <a:prstDash val="solid"/>
         </a:ln>
-        <a:ln w="19050" cap="flat" cmpd="sng" algn="ctr">
-          <a:solidFill>
-            <a:schemeClr val="phClr"/>
-          </a:solidFill>
-          <a:prstDash val="solid"/>
-        </a:ln>
-        <a:ln w="47625" cap="flat" cmpd="dbl" algn="ctr">
+        <a:ln w="38100" cap="flat" cmpd="sng" algn="ctr">
           <a:solidFill>
             <a:schemeClr val="phClr"/>
           </a:solidFill>
@@ -4346,32 +5138,29 @@
         </a:effectStyle>
         <a:effectStyle>
           <a:effectLst>
-            <a:outerShdw blurRad="31750" dist="25400" dir="5400000" rotWithShape="0">
+            <a:outerShdw blurRad="50800" dist="25400" algn="bl" rotWithShape="0">
               <a:srgbClr val="000000">
-                <a:alpha val="50000"/>
+                <a:alpha val="60000"/>
               </a:srgbClr>
             </a:outerShdw>
           </a:effectLst>
         </a:effectStyle>
         <a:effectStyle>
-          <a:effectLst>
-            <a:outerShdw blurRad="38100" dist="25400" dir="5400000" rotWithShape="0">
-              <a:srgbClr val="000000">
-                <a:alpha val="45000"/>
-              </a:srgbClr>
-            </a:outerShdw>
-          </a:effectLst>
+          <a:effectLst/>
           <a:scene3d>
             <a:camera prst="orthographicFront">
               <a:rot lat="0" lon="0" rev="0"/>
             </a:camera>
-            <a:lightRig rig="brightRoom" dir="t"/>
+            <a:lightRig rig="brightRoom" dir="tl">
+              <a:rot lat="0" lon="0" rev="1800000"/>
+            </a:lightRig>
           </a:scene3d>
-          <a:sp3d extrusionH="12700" contourW="25400" prstMaterial="flat">
-            <a:bevelT w="63500" h="152400" prst="angle"/>
+          <a:sp3d contourW="10160" prstMaterial="dkEdge">
+            <a:bevelT w="38100" h="50800" prst="angle"/>
             <a:contourClr>
               <a:schemeClr val="phClr">
-                <a:shade val="30000"/>
+                <a:shade val="40000"/>
+                <a:satMod val="150000"/>
               </a:schemeClr>
             </a:contourClr>
           </a:sp3d>
@@ -4381,26 +5170,42 @@
         <a:solidFill>
           <a:schemeClr val="phClr"/>
         </a:solidFill>
-        <a:solidFill>
-          <a:schemeClr val="phClr">
-            <a:tint val="90000"/>
-            <a:shade val="93000"/>
-            <a:satMod val="150000"/>
-          </a:schemeClr>
-        </a:solidFill>
+        <a:gradFill rotWithShape="1">
+          <a:gsLst>
+            <a:gs pos="0">
+              <a:schemeClr val="phClr">
+                <a:tint val="90000"/>
+              </a:schemeClr>
+            </a:gs>
+            <a:gs pos="75000">
+              <a:schemeClr val="phClr">
+                <a:shade val="100000"/>
+                <a:satMod val="115000"/>
+              </a:schemeClr>
+            </a:gs>
+            <a:gs pos="100000">
+              <a:schemeClr val="phClr">
+                <a:shade val="70000"/>
+                <a:satMod val="130000"/>
+              </a:schemeClr>
+            </a:gs>
+          </a:gsLst>
+          <a:path path="circle">
+            <a:fillToRect l="20000" t="50000" r="100000" b="50000"/>
+          </a:path>
+        </a:gradFill>
         <a:blipFill rotWithShape="1">
           <a:blip xmlns:r="http://schemas.openxmlformats.org/officeDocument/2006/relationships" r:embed="rId1">
             <a:duotone>
               <a:schemeClr val="phClr">
-                <a:tint val="95000"/>
+                <a:tint val="97000"/>
               </a:schemeClr>
               <a:schemeClr val="phClr">
-                <a:shade val="93000"/>
-                <a:satMod val="110000"/>
+                <a:shade val="96000"/>
               </a:schemeClr>
             </a:duotone>
           </a:blip>
-          <a:tile tx="0" ty="0" sx="100000" sy="100000" flip="none" algn="tl"/>
+          <a:tile tx="0" ty="0" sx="32000" sy="32000" flip="none" algn="tl"/>
         </a:blipFill>
       </a:bgFillStyleLst>
     </a:fmtScheme>

</xml_diff>